<commit_message>
Update Floating Point Squareroot.pptx
</commit_message>
<xml_diff>
--- a/Group Project/FloatingPointSquareRoot/Floating Point Squareroot.pptx
+++ b/Group Project/FloatingPointSquareRoot/Floating Point Squareroot.pptx
@@ -5,29 +5,30 @@
     <p:sldMasterId id="2147483660" r:id="rId1"/>
   </p:sldMasterIdLst>
   <p:sldIdLst>
-    <p:sldId id="256" r:id="rId2"/>
-    <p:sldId id="257" r:id="rId3"/>
-    <p:sldId id="258" r:id="rId4"/>
-    <p:sldId id="261" r:id="rId5"/>
-    <p:sldId id="276" r:id="rId6"/>
-    <p:sldId id="259" r:id="rId7"/>
-    <p:sldId id="264" r:id="rId8"/>
-    <p:sldId id="265" r:id="rId9"/>
-    <p:sldId id="266" r:id="rId10"/>
-    <p:sldId id="260" r:id="rId11"/>
-    <p:sldId id="263" r:id="rId12"/>
-    <p:sldId id="271" r:id="rId13"/>
-    <p:sldId id="281" r:id="rId14"/>
-    <p:sldId id="269" r:id="rId15"/>
-    <p:sldId id="282" r:id="rId16"/>
-    <p:sldId id="280" r:id="rId17"/>
-    <p:sldId id="272" r:id="rId18"/>
-    <p:sldId id="273" r:id="rId19"/>
-    <p:sldId id="274" r:id="rId20"/>
-    <p:sldId id="275" r:id="rId21"/>
-    <p:sldId id="278" r:id="rId22"/>
-    <p:sldId id="279" r:id="rId23"/>
-    <p:sldId id="277" r:id="rId24"/>
+    <p:sldId id="283" r:id="rId2"/>
+    <p:sldId id="256" r:id="rId3"/>
+    <p:sldId id="257" r:id="rId4"/>
+    <p:sldId id="258" r:id="rId5"/>
+    <p:sldId id="261" r:id="rId6"/>
+    <p:sldId id="276" r:id="rId7"/>
+    <p:sldId id="259" r:id="rId8"/>
+    <p:sldId id="264" r:id="rId9"/>
+    <p:sldId id="265" r:id="rId10"/>
+    <p:sldId id="266" r:id="rId11"/>
+    <p:sldId id="260" r:id="rId12"/>
+    <p:sldId id="263" r:id="rId13"/>
+    <p:sldId id="271" r:id="rId14"/>
+    <p:sldId id="281" r:id="rId15"/>
+    <p:sldId id="269" r:id="rId16"/>
+    <p:sldId id="282" r:id="rId17"/>
+    <p:sldId id="280" r:id="rId18"/>
+    <p:sldId id="272" r:id="rId19"/>
+    <p:sldId id="273" r:id="rId20"/>
+    <p:sldId id="274" r:id="rId21"/>
+    <p:sldId id="275" r:id="rId22"/>
+    <p:sldId id="278" r:id="rId23"/>
+    <p:sldId id="279" r:id="rId24"/>
+    <p:sldId id="277" r:id="rId25"/>
   </p:sldIdLst>
   <p:sldSz cx="12192000" cy="6858000"/>
   <p:notesSz cx="6858000" cy="9144000"/>
@@ -5630,6 +5631,806 @@
 <file path=ppt/slides/slide1.xml><?xml version="1.0" encoding="utf-8"?>
 <p:sld xmlns:a="http://schemas.openxmlformats.org/drawingml/2006/main" xmlns:r="http://schemas.openxmlformats.org/officeDocument/2006/relationships" xmlns:p="http://schemas.openxmlformats.org/presentationml/2006/main">
   <p:cSld>
+    <p:bg>
+      <p:bgPr>
+        <a:blipFill dpi="0" rotWithShape="1">
+          <a:blip r:embed="rId2">
+            <a:lum/>
+          </a:blip>
+          <a:srcRect/>
+          <a:stretch>
+            <a:fillRect/>
+          </a:stretch>
+        </a:blipFill>
+        <a:effectLst/>
+      </p:bgPr>
+    </p:bg>
+    <p:spTree>
+      <p:nvGrpSpPr>
+        <p:cNvPr id="1" name=""/>
+        <p:cNvGrpSpPr/>
+        <p:nvPr/>
+      </p:nvGrpSpPr>
+      <p:grpSpPr>
+        <a:xfrm>
+          <a:off x="0" y="0"/>
+          <a:ext cx="0" cy="0"/>
+          <a:chOff x="0" y="0"/>
+          <a:chExt cx="0" cy="0"/>
+        </a:xfrm>
+      </p:grpSpPr>
+      <p:sp useBgFill="1">
+        <p:nvSpPr>
+          <p:cNvPr id="4" name="Rectangle 3"/>
+          <p:cNvSpPr/>
+          <p:nvPr/>
+        </p:nvSpPr>
+        <p:spPr>
+          <a:xfrm>
+            <a:off x="0" y="0"/>
+            <a:ext cx="12192000" cy="6858000"/>
+          </a:xfrm>
+          <a:prstGeom prst="rect">
+            <a:avLst/>
+          </a:prstGeom>
+          <a:ln>
+            <a:noFill/>
+          </a:ln>
+        </p:spPr>
+        <p:style>
+          <a:lnRef idx="2">
+            <a:schemeClr val="accent1">
+              <a:shade val="50000"/>
+            </a:schemeClr>
+          </a:lnRef>
+          <a:fillRef idx="1">
+            <a:schemeClr val="accent1"/>
+          </a:fillRef>
+          <a:effectRef idx="0">
+            <a:schemeClr val="accent1"/>
+          </a:effectRef>
+          <a:fontRef idx="minor">
+            <a:schemeClr val="lt1"/>
+          </a:fontRef>
+        </p:style>
+        <p:txBody>
+          <a:bodyPr rtlCol="0" anchor="ctr"/>
+          <a:lstStyle/>
+          <a:p>
+            <a:pPr algn="ctr"/>
+            <a:endParaRPr lang="en-US"/>
+          </a:p>
+        </p:txBody>
+      </p:sp>
+      <p:sp>
+        <p:nvSpPr>
+          <p:cNvPr id="12" name="Title 1">
+            <a:extLst>
+              <a:ext uri="{FF2B5EF4-FFF2-40B4-BE49-F238E27FC236}">
+                <a16:creationId xmlns:a16="http://schemas.microsoft.com/office/drawing/2014/main" id="{20D6E905-B772-4AEC-8410-5361487ABA35}"/>
+              </a:ext>
+            </a:extLst>
+          </p:cNvPr>
+          <p:cNvSpPr txBox="1">
+            <a:spLocks/>
+          </p:cNvSpPr>
+          <p:nvPr/>
+        </p:nvSpPr>
+        <p:spPr>
+          <a:xfrm>
+            <a:off x="3490034" y="2023511"/>
+            <a:ext cx="5211931" cy="1183515"/>
+          </a:xfrm>
+          <a:prstGeom prst="rect">
+            <a:avLst/>
+          </a:prstGeom>
+        </p:spPr>
+        <p:txBody>
+          <a:bodyPr/>
+          <a:lstStyle>
+            <a:lvl1pPr algn="ctr" defTabSz="914400" rtl="0" eaLnBrk="1" latinLnBrk="0" hangingPunct="1">
+              <a:lnSpc>
+                <a:spcPct val="90000"/>
+              </a:lnSpc>
+              <a:spcBef>
+                <a:spcPct val="0"/>
+              </a:spcBef>
+              <a:buNone/>
+              <a:defRPr sz="3400" b="1" i="0" kern="1200" cap="all">
+                <a:solidFill>
+                  <a:schemeClr val="tx1"/>
+                </a:solidFill>
+                <a:effectLst>
+                  <a:outerShdw blurRad="50800" dist="63500" dir="2700000" algn="tl" rotWithShape="0">
+                    <a:srgbClr val="000000">
+                      <a:alpha val="48000"/>
+                    </a:srgbClr>
+                  </a:outerShdw>
+                </a:effectLst>
+                <a:latin typeface="+mj-lt"/>
+                <a:ea typeface="+mj-ea"/>
+                <a:cs typeface="+mj-cs"/>
+              </a:defRPr>
+            </a:lvl1pPr>
+          </a:lstStyle>
+          <a:p>
+            <a:r>
+              <a:rPr lang="en-US" sz="3600" dirty="0"/>
+              <a:t>Floating</a:t>
+            </a:r>
+            <a:r>
+              <a:rPr lang="vi-VN" sz="3600" dirty="0"/>
+              <a:t>-</a:t>
+            </a:r>
+            <a:r>
+              <a:rPr lang="en-US" sz="3600" dirty="0"/>
+              <a:t>Point Square</a:t>
+            </a:r>
+            <a:r>
+              <a:rPr lang="vi-VN" sz="3600" dirty="0"/>
+              <a:t> </a:t>
+            </a:r>
+            <a:r>
+              <a:rPr lang="en-US" sz="3600" dirty="0"/>
+              <a:t>root</a:t>
+            </a:r>
+          </a:p>
+        </p:txBody>
+      </p:sp>
+      <p:sp useBgFill="1">
+        <p:nvSpPr>
+          <p:cNvPr id="9" name="Rectangle 8"/>
+          <p:cNvSpPr/>
+          <p:nvPr/>
+        </p:nvSpPr>
+        <p:spPr>
+          <a:xfrm>
+            <a:off x="0" y="0"/>
+            <a:ext cx="5562600" cy="6858000"/>
+          </a:xfrm>
+          <a:prstGeom prst="rect">
+            <a:avLst/>
+          </a:prstGeom>
+          <a:ln>
+            <a:noFill/>
+          </a:ln>
+          <a:effectLst>
+            <a:outerShdw blurRad="381000" dist="38100" algn="l" rotWithShape="0">
+              <a:prstClr val="black">
+                <a:alpha val="30000"/>
+              </a:prstClr>
+            </a:outerShdw>
+          </a:effectLst>
+        </p:spPr>
+        <p:style>
+          <a:lnRef idx="2">
+            <a:schemeClr val="accent1">
+              <a:shade val="50000"/>
+            </a:schemeClr>
+          </a:lnRef>
+          <a:fillRef idx="1">
+            <a:schemeClr val="accent1"/>
+          </a:fillRef>
+          <a:effectRef idx="0">
+            <a:schemeClr val="accent1"/>
+          </a:effectRef>
+          <a:fontRef idx="minor">
+            <a:schemeClr val="lt1"/>
+          </a:fontRef>
+        </p:style>
+        <p:txBody>
+          <a:bodyPr rtlCol="0" anchor="ctr"/>
+          <a:lstStyle/>
+          <a:p>
+            <a:pPr algn="ctr"/>
+            <a:endParaRPr lang="en-US"/>
+          </a:p>
+        </p:txBody>
+      </p:sp>
+      <p:sp useBgFill="1">
+        <p:nvSpPr>
+          <p:cNvPr id="10" name="Rectangle 9"/>
+          <p:cNvSpPr/>
+          <p:nvPr/>
+        </p:nvSpPr>
+        <p:spPr>
+          <a:xfrm>
+            <a:off x="6629400" y="0"/>
+            <a:ext cx="5562600" cy="6858000"/>
+          </a:xfrm>
+          <a:prstGeom prst="rect">
+            <a:avLst/>
+          </a:prstGeom>
+          <a:ln>
+            <a:noFill/>
+          </a:ln>
+          <a:effectLst>
+            <a:outerShdw blurRad="381000" dist="38100" dir="10800000" algn="r" rotWithShape="0">
+              <a:prstClr val="black">
+                <a:alpha val="30000"/>
+              </a:prstClr>
+            </a:outerShdw>
+          </a:effectLst>
+        </p:spPr>
+        <p:style>
+          <a:lnRef idx="2">
+            <a:schemeClr val="accent1">
+              <a:shade val="50000"/>
+            </a:schemeClr>
+          </a:lnRef>
+          <a:fillRef idx="1">
+            <a:schemeClr val="accent1"/>
+          </a:fillRef>
+          <a:effectRef idx="0">
+            <a:schemeClr val="accent1"/>
+          </a:effectRef>
+          <a:fontRef idx="minor">
+            <a:schemeClr val="lt1"/>
+          </a:fontRef>
+        </p:style>
+        <p:txBody>
+          <a:bodyPr rtlCol="0" anchor="ctr"/>
+          <a:lstStyle/>
+          <a:p>
+            <a:pPr algn="ctr"/>
+            <a:endParaRPr lang="en-US"/>
+          </a:p>
+        </p:txBody>
+      </p:sp>
+      <p:sp>
+        <p:nvSpPr>
+          <p:cNvPr id="15" name="Title 1">
+            <a:extLst>
+              <a:ext uri="{FF2B5EF4-FFF2-40B4-BE49-F238E27FC236}">
+                <a16:creationId xmlns:a16="http://schemas.microsoft.com/office/drawing/2014/main" id="{0C4B4F02-0778-4D4D-A82A-06004136D93B}"/>
+              </a:ext>
+            </a:extLst>
+          </p:cNvPr>
+          <p:cNvSpPr txBox="1">
+            <a:spLocks/>
+          </p:cNvSpPr>
+          <p:nvPr/>
+        </p:nvSpPr>
+        <p:spPr>
+          <a:xfrm>
+            <a:off x="3490034" y="4047022"/>
+            <a:ext cx="5211931" cy="1183515"/>
+          </a:xfrm>
+          <a:prstGeom prst="rect">
+            <a:avLst/>
+          </a:prstGeom>
+        </p:spPr>
+        <p:txBody>
+          <a:bodyPr/>
+          <a:lstStyle>
+            <a:lvl1pPr algn="ctr" defTabSz="914400" rtl="0" eaLnBrk="1" latinLnBrk="0" hangingPunct="1">
+              <a:lnSpc>
+                <a:spcPct val="90000"/>
+              </a:lnSpc>
+              <a:spcBef>
+                <a:spcPct val="0"/>
+              </a:spcBef>
+              <a:buNone/>
+              <a:defRPr sz="3400" b="1" i="0" kern="1200" cap="all">
+                <a:solidFill>
+                  <a:schemeClr val="tx1"/>
+                </a:solidFill>
+                <a:effectLst>
+                  <a:outerShdw blurRad="50800" dist="63500" dir="2700000" algn="tl" rotWithShape="0">
+                    <a:srgbClr val="000000">
+                      <a:alpha val="48000"/>
+                    </a:srgbClr>
+                  </a:outerShdw>
+                </a:effectLst>
+                <a:latin typeface="+mj-lt"/>
+                <a:ea typeface="+mj-ea"/>
+                <a:cs typeface="+mj-cs"/>
+              </a:defRPr>
+            </a:lvl1pPr>
+          </a:lstStyle>
+          <a:p>
+            <a:pPr>
+              <a:lnSpc>
+                <a:spcPct val="100000"/>
+              </a:lnSpc>
+              <a:spcAft>
+                <a:spcPts val="800"/>
+              </a:spcAft>
+            </a:pPr>
+            <a:r>
+              <a:rPr lang="en-US" sz="2400" dirty="0">
+                <a:effectLst/>
+                <a:latin typeface="Rockwell" panose="02060603020205020403" pitchFamily="18" charset="0"/>
+                <a:ea typeface="SimSun" panose="02010600030101010101" pitchFamily="2" charset="-122"/>
+                <a:cs typeface="Arial" panose="020B0604020202020204" pitchFamily="34" charset="0"/>
+              </a:rPr>
+              <a:t>Team members:</a:t>
+            </a:r>
+            <a:endParaRPr lang="en-GB" sz="2400" dirty="0">
+              <a:effectLst/>
+              <a:latin typeface="Calibri" panose="020F0502020204030204" pitchFamily="34" charset="0"/>
+              <a:ea typeface="SimSun" panose="02010600030101010101" pitchFamily="2" charset="-122"/>
+              <a:cs typeface="Arial" panose="020B0604020202020204" pitchFamily="34" charset="0"/>
+            </a:endParaRPr>
+          </a:p>
+          <a:p>
+            <a:pPr>
+              <a:lnSpc>
+                <a:spcPct val="100000"/>
+              </a:lnSpc>
+              <a:spcAft>
+                <a:spcPts val="800"/>
+              </a:spcAft>
+            </a:pPr>
+            <a:r>
+              <a:rPr lang="en-US" sz="2400" dirty="0">
+                <a:effectLst/>
+                <a:latin typeface="Rockwell" panose="02060603020205020403" pitchFamily="18" charset="0"/>
+                <a:ea typeface="SimSun" panose="02010600030101010101" pitchFamily="2" charset="-122"/>
+                <a:cs typeface="Arial" panose="020B0604020202020204" pitchFamily="34" charset="0"/>
+              </a:rPr>
+              <a:t>H</a:t>
+            </a:r>
+            <a:r>
+              <a:rPr lang="vi-VN" sz="2400" dirty="0">
+                <a:effectLst/>
+                <a:latin typeface="Rockwell" panose="02060603020205020403" pitchFamily="18" charset="0"/>
+                <a:ea typeface="SimSun" panose="02010600030101010101" pitchFamily="2" charset="-122"/>
+                <a:cs typeface="Arial" panose="020B0604020202020204" pitchFamily="34" charset="0"/>
+              </a:rPr>
+              <a:t>o hai cong </a:t>
+            </a:r>
+            <a:r>
+              <a:rPr lang="vi-VN" sz="2400" dirty="0" err="1">
+                <a:effectLst/>
+                <a:latin typeface="Rockwell" panose="02060603020205020403" pitchFamily="18" charset="0"/>
+                <a:ea typeface="SimSun" panose="02010600030101010101" pitchFamily="2" charset="-122"/>
+                <a:cs typeface="Arial" panose="020B0604020202020204" pitchFamily="34" charset="0"/>
+              </a:rPr>
+              <a:t>thuA</a:t>
+            </a:r>
+            <a:r>
+              <a:rPr lang="en-US" sz="2400" dirty="0">
+                <a:effectLst/>
+                <a:latin typeface="Rockwell" panose="02060603020205020403" pitchFamily="18" charset="0"/>
+                <a:ea typeface="SimSun" panose="02010600030101010101" pitchFamily="2" charset="-122"/>
+                <a:cs typeface="Arial" panose="020B0604020202020204" pitchFamily="34" charset="0"/>
+              </a:rPr>
+              <a:t>n – 1852</a:t>
+            </a:r>
+            <a:r>
+              <a:rPr lang="vi-VN" sz="2400" dirty="0">
+                <a:effectLst/>
+                <a:latin typeface="Rockwell" panose="02060603020205020403" pitchFamily="18" charset="0"/>
+                <a:ea typeface="SimSun" panose="02010600030101010101" pitchFamily="2" charset="-122"/>
+                <a:cs typeface="Arial" panose="020B0604020202020204" pitchFamily="34" charset="0"/>
+              </a:rPr>
+              <a:t>1469</a:t>
+            </a:r>
+            <a:endParaRPr lang="en-GB" sz="2400" dirty="0">
+              <a:effectLst/>
+              <a:latin typeface="Calibri" panose="020F0502020204030204" pitchFamily="34" charset="0"/>
+              <a:ea typeface="SimSun" panose="02010600030101010101" pitchFamily="2" charset="-122"/>
+              <a:cs typeface="Arial" panose="020B0604020202020204" pitchFamily="34" charset="0"/>
+            </a:endParaRPr>
+          </a:p>
+          <a:p>
+            <a:pPr>
+              <a:lnSpc>
+                <a:spcPct val="100000"/>
+              </a:lnSpc>
+              <a:spcAft>
+                <a:spcPts val="800"/>
+              </a:spcAft>
+            </a:pPr>
+            <a:r>
+              <a:rPr lang="en-US" sz="2400" dirty="0">
+                <a:effectLst/>
+                <a:latin typeface="Rockwell" panose="02060603020205020403" pitchFamily="18" charset="0"/>
+                <a:ea typeface="SimSun" panose="02010600030101010101" pitchFamily="2" charset="-122"/>
+                <a:cs typeface="Arial" panose="020B0604020202020204" pitchFamily="34" charset="0"/>
+              </a:rPr>
+              <a:t>H</a:t>
+            </a:r>
+            <a:r>
+              <a:rPr lang="vi-VN" sz="2400" dirty="0">
+                <a:effectLst/>
+                <a:latin typeface="Rockwell" panose="02060603020205020403" pitchFamily="18" charset="0"/>
+                <a:ea typeface="SimSun" panose="02010600030101010101" pitchFamily="2" charset="-122"/>
+                <a:cs typeface="Arial" panose="020B0604020202020204" pitchFamily="34" charset="0"/>
+              </a:rPr>
+              <a:t>a </a:t>
+            </a:r>
+            <a:r>
+              <a:rPr lang="vi-VN" sz="2400" dirty="0" err="1">
+                <a:effectLst/>
+                <a:latin typeface="Rockwell" panose="02060603020205020403" pitchFamily="18" charset="0"/>
+                <a:ea typeface="SimSun" panose="02010600030101010101" pitchFamily="2" charset="-122"/>
+                <a:cs typeface="Arial" panose="020B0604020202020204" pitchFamily="34" charset="0"/>
+              </a:rPr>
+              <a:t>kieu</a:t>
+            </a:r>
+            <a:r>
+              <a:rPr lang="vi-VN" sz="2400" dirty="0">
+                <a:effectLst/>
+                <a:latin typeface="Rockwell" panose="02060603020205020403" pitchFamily="18" charset="0"/>
+                <a:ea typeface="SimSun" panose="02010600030101010101" pitchFamily="2" charset="-122"/>
+                <a:cs typeface="Arial" panose="020B0604020202020204" pitchFamily="34" charset="0"/>
+              </a:rPr>
+              <a:t> trang</a:t>
+            </a:r>
+            <a:r>
+              <a:rPr lang="en-US" sz="2400" dirty="0">
+                <a:effectLst/>
+                <a:latin typeface="Rockwell" panose="02060603020205020403" pitchFamily="18" charset="0"/>
+                <a:ea typeface="SimSun" panose="02010600030101010101" pitchFamily="2" charset="-122"/>
+                <a:cs typeface="Arial" panose="020B0604020202020204" pitchFamily="34" charset="0"/>
+              </a:rPr>
+              <a:t> – 18521522</a:t>
+            </a:r>
+            <a:endParaRPr lang="en-GB" sz="2400" dirty="0">
+              <a:effectLst/>
+              <a:latin typeface="Calibri" panose="020F0502020204030204" pitchFamily="34" charset="0"/>
+              <a:ea typeface="SimSun" panose="02010600030101010101" pitchFamily="2" charset="-122"/>
+              <a:cs typeface="Arial" panose="020B0604020202020204" pitchFamily="34" charset="0"/>
+            </a:endParaRPr>
+          </a:p>
+        </p:txBody>
+      </p:sp>
+      <p:sp useBgFill="1">
+        <p:nvSpPr>
+          <p:cNvPr id="11" name="Rectangle 10"/>
+          <p:cNvSpPr/>
+          <p:nvPr/>
+        </p:nvSpPr>
+        <p:spPr>
+          <a:xfrm>
+            <a:off x="0" y="0"/>
+            <a:ext cx="4343400" cy="6858000"/>
+          </a:xfrm>
+          <a:prstGeom prst="rect">
+            <a:avLst/>
+          </a:prstGeom>
+          <a:ln>
+            <a:noFill/>
+          </a:ln>
+          <a:effectLst>
+            <a:outerShdw blurRad="381000" dist="38100" algn="l" rotWithShape="0">
+              <a:prstClr val="black">
+                <a:alpha val="30000"/>
+              </a:prstClr>
+            </a:outerShdw>
+          </a:effectLst>
+        </p:spPr>
+        <p:style>
+          <a:lnRef idx="2">
+            <a:schemeClr val="accent1">
+              <a:shade val="50000"/>
+            </a:schemeClr>
+          </a:lnRef>
+          <a:fillRef idx="1">
+            <a:schemeClr val="accent1"/>
+          </a:fillRef>
+          <a:effectRef idx="0">
+            <a:schemeClr val="accent1"/>
+          </a:effectRef>
+          <a:fontRef idx="minor">
+            <a:schemeClr val="lt1"/>
+          </a:fontRef>
+        </p:style>
+        <p:txBody>
+          <a:bodyPr rtlCol="0" anchor="ctr"/>
+          <a:lstStyle/>
+          <a:p>
+            <a:pPr algn="ctr"/>
+            <a:endParaRPr lang="en-US"/>
+          </a:p>
+        </p:txBody>
+      </p:sp>
+      <p:sp useBgFill="1">
+        <p:nvSpPr>
+          <p:cNvPr id="13" name="Rectangle 12"/>
+          <p:cNvSpPr/>
+          <p:nvPr/>
+        </p:nvSpPr>
+        <p:spPr>
+          <a:xfrm>
+            <a:off x="7874000" y="0"/>
+            <a:ext cx="4318000" cy="6858000"/>
+          </a:xfrm>
+          <a:prstGeom prst="rect">
+            <a:avLst/>
+          </a:prstGeom>
+          <a:ln>
+            <a:noFill/>
+          </a:ln>
+          <a:effectLst>
+            <a:outerShdw blurRad="381000" dist="38100" dir="10800000" algn="r" rotWithShape="0">
+              <a:prstClr val="black">
+                <a:alpha val="30000"/>
+              </a:prstClr>
+            </a:outerShdw>
+          </a:effectLst>
+        </p:spPr>
+        <p:style>
+          <a:lnRef idx="2">
+            <a:schemeClr val="accent1">
+              <a:shade val="50000"/>
+            </a:schemeClr>
+          </a:lnRef>
+          <a:fillRef idx="1">
+            <a:schemeClr val="accent1"/>
+          </a:fillRef>
+          <a:effectRef idx="0">
+            <a:schemeClr val="accent1"/>
+          </a:effectRef>
+          <a:fontRef idx="minor">
+            <a:schemeClr val="lt1"/>
+          </a:fontRef>
+        </p:style>
+        <p:txBody>
+          <a:bodyPr rtlCol="0" anchor="ctr"/>
+          <a:lstStyle/>
+          <a:p>
+            <a:pPr algn="ctr"/>
+            <a:endParaRPr lang="en-US"/>
+          </a:p>
+        </p:txBody>
+      </p:sp>
+    </p:spTree>
+    <p:extLst>
+      <p:ext uri="{BB962C8B-B14F-4D97-AF65-F5344CB8AC3E}">
+        <p14:creationId xmlns:p14="http://schemas.microsoft.com/office/powerpoint/2010/main" val="306567956"/>
+      </p:ext>
+    </p:extLst>
+  </p:cSld>
+  <p:clrMapOvr>
+    <a:masterClrMapping/>
+  </p:clrMapOvr>
+  <p:timing>
+    <p:tnLst>
+      <p:par>
+        <p:cTn id="1" dur="indefinite" restart="never" nodeType="tmRoot">
+          <p:childTnLst>
+            <p:seq concurrent="1" nextAc="seek">
+              <p:cTn id="2" dur="indefinite" nodeType="mainSeq">
+                <p:childTnLst>
+                  <p:par>
+                    <p:cTn id="3" fill="hold">
+                      <p:stCondLst>
+                        <p:cond delay="indefinite"/>
+                        <p:cond evt="onBegin" delay="0">
+                          <p:tn val="2"/>
+                        </p:cond>
+                      </p:stCondLst>
+                      <p:childTnLst>
+                        <p:par>
+                          <p:cTn id="4" fill="hold">
+                            <p:stCondLst>
+                              <p:cond delay="0"/>
+                            </p:stCondLst>
+                            <p:childTnLst>
+                              <p:par>
+                                <p:cTn id="5" presetID="35" presetClass="path" presetSubtype="0" repeatCount="indefinite" accel="25000" decel="25000" autoRev="1" fill="hold" grpId="0" nodeType="withEffect">
+                                  <p:stCondLst>
+                                    <p:cond delay="0"/>
+                                  </p:stCondLst>
+                                  <p:childTnLst>
+                                    <p:animMotion origin="layout" path="M -0.09584 -1.96532E-6 L -0.34584 -1.96532E-6 " pathEditMode="relative" rAng="0" ptsTypes="AA">
+                                      <p:cBhvr>
+                                        <p:cTn id="6" dur="4000" fill="hold"/>
+                                        <p:tgtEl>
+                                          <p:spTgt spid="11"/>
+                                        </p:tgtEl>
+                                        <p:attrNameLst>
+                                          <p:attrName>ppt_x</p:attrName>
+                                          <p:attrName>ppt_y</p:attrName>
+                                        </p:attrNameLst>
+                                      </p:cBhvr>
+                                      <p:rCtr x="-12500" y="0"/>
+                                    </p:animMotion>
+                                  </p:childTnLst>
+                                </p:cTn>
+                              </p:par>
+                              <p:par>
+                                <p:cTn id="7" presetID="6" presetClass="emph" presetSubtype="0" repeatCount="indefinite" accel="25000" decel="25000" autoRev="1" fill="hold" grpId="1" nodeType="withEffect">
+                                  <p:stCondLst>
+                                    <p:cond delay="0"/>
+                                  </p:stCondLst>
+                                  <p:childTnLst>
+                                    <p:animScale>
+                                      <p:cBhvr>
+                                        <p:cTn id="8" dur="4000" fill="hold"/>
+                                        <p:tgtEl>
+                                          <p:spTgt spid="11"/>
+                                        </p:tgtEl>
+                                      </p:cBhvr>
+                                      <p:by x="150000" y="100000"/>
+                                    </p:animScale>
+                                  </p:childTnLst>
+                                </p:cTn>
+                              </p:par>
+                              <p:par>
+                                <p:cTn id="9" presetID="35" presetClass="path" presetSubtype="0" repeatCount="indefinite" accel="25000" decel="25000" autoRev="1" fill="hold" grpId="0" nodeType="withEffect">
+                                  <p:stCondLst>
+                                    <p:cond delay="0"/>
+                                  </p:stCondLst>
+                                  <p:childTnLst>
+                                    <p:animMotion origin="layout" path="M 0 0 L -0.25 0 E" pathEditMode="relative" ptsTypes="">
+                                      <p:cBhvr>
+                                        <p:cTn id="10" dur="4000" fill="hold"/>
+                                        <p:tgtEl>
+                                          <p:spTgt spid="9"/>
+                                        </p:tgtEl>
+                                        <p:attrNameLst>
+                                          <p:attrName>ppt_x</p:attrName>
+                                          <p:attrName>ppt_y</p:attrName>
+                                        </p:attrNameLst>
+                                      </p:cBhvr>
+                                    </p:animMotion>
+                                  </p:childTnLst>
+                                </p:cTn>
+                              </p:par>
+                              <p:par>
+                                <p:cTn id="11" presetID="6" presetClass="emph" presetSubtype="0" repeatCount="indefinite" accel="25000" decel="25000" autoRev="1" fill="hold" grpId="1" nodeType="withEffect">
+                                  <p:stCondLst>
+                                    <p:cond delay="0"/>
+                                  </p:stCondLst>
+                                  <p:childTnLst>
+                                    <p:animScale>
+                                      <p:cBhvr>
+                                        <p:cTn id="12" dur="4000" fill="hold"/>
+                                        <p:tgtEl>
+                                          <p:spTgt spid="9"/>
+                                        </p:tgtEl>
+                                      </p:cBhvr>
+                                      <p:by x="100000" y="150000"/>
+                                    </p:animScale>
+                                  </p:childTnLst>
+                                </p:cTn>
+                              </p:par>
+                              <p:par>
+                                <p:cTn id="13" presetID="63" presetClass="path" presetSubtype="0" repeatCount="indefinite" accel="25000" decel="25000" autoRev="1" fill="hold" grpId="0" nodeType="withEffect">
+                                  <p:stCondLst>
+                                    <p:cond delay="0"/>
+                                  </p:stCondLst>
+                                  <p:childTnLst>
+                                    <p:animMotion origin="layout" path="M 0.10972 -1.96532E-6 L 0.35972 -1.96532E-6 " pathEditMode="relative" rAng="0" ptsTypes="AA">
+                                      <p:cBhvr>
+                                        <p:cTn id="14" dur="4000" fill="hold"/>
+                                        <p:tgtEl>
+                                          <p:spTgt spid="13"/>
+                                        </p:tgtEl>
+                                        <p:attrNameLst>
+                                          <p:attrName>ppt_x</p:attrName>
+                                          <p:attrName>ppt_y</p:attrName>
+                                        </p:attrNameLst>
+                                      </p:cBhvr>
+                                      <p:rCtr x="12500" y="0"/>
+                                    </p:animMotion>
+                                  </p:childTnLst>
+                                </p:cTn>
+                              </p:par>
+                              <p:par>
+                                <p:cTn id="15" presetID="6" presetClass="emph" presetSubtype="0" repeatCount="indefinite" accel="25000" decel="25000" autoRev="1" fill="hold" grpId="1" nodeType="withEffect">
+                                  <p:stCondLst>
+                                    <p:cond delay="0"/>
+                                  </p:stCondLst>
+                                  <p:childTnLst>
+                                    <p:animScale>
+                                      <p:cBhvr>
+                                        <p:cTn id="16" dur="4000" fill="hold"/>
+                                        <p:tgtEl>
+                                          <p:spTgt spid="13"/>
+                                        </p:tgtEl>
+                                      </p:cBhvr>
+                                      <p:by x="150000" y="100000"/>
+                                    </p:animScale>
+                                  </p:childTnLst>
+                                </p:cTn>
+                              </p:par>
+                              <p:par>
+                                <p:cTn id="17" presetID="63" presetClass="path" presetSubtype="0" repeatCount="indefinite" accel="25000" decel="25000" autoRev="1" fill="hold" grpId="0" nodeType="withEffect">
+                                  <p:stCondLst>
+                                    <p:cond delay="0"/>
+                                  </p:stCondLst>
+                                  <p:childTnLst>
+                                    <p:animMotion origin="layout" path="M 0 0 L 0.25 0 E" pathEditMode="relative" ptsTypes="">
+                                      <p:cBhvr>
+                                        <p:cTn id="18" dur="4000" fill="hold"/>
+                                        <p:tgtEl>
+                                          <p:spTgt spid="10"/>
+                                        </p:tgtEl>
+                                        <p:attrNameLst>
+                                          <p:attrName>ppt_x</p:attrName>
+                                          <p:attrName>ppt_y</p:attrName>
+                                        </p:attrNameLst>
+                                      </p:cBhvr>
+                                    </p:animMotion>
+                                  </p:childTnLst>
+                                </p:cTn>
+                              </p:par>
+                              <p:par>
+                                <p:cTn id="19" presetID="6" presetClass="emph" presetSubtype="0" repeatCount="indefinite" accel="25000" decel="25000" autoRev="1" fill="hold" grpId="1" nodeType="withEffect">
+                                  <p:stCondLst>
+                                    <p:cond delay="0"/>
+                                  </p:stCondLst>
+                                  <p:childTnLst>
+                                    <p:animScale>
+                                      <p:cBhvr>
+                                        <p:cTn id="20" dur="4000" fill="hold"/>
+                                        <p:tgtEl>
+                                          <p:spTgt spid="10"/>
+                                        </p:tgtEl>
+                                      </p:cBhvr>
+                                      <p:by x="100000" y="150000"/>
+                                    </p:animScale>
+                                  </p:childTnLst>
+                                </p:cTn>
+                              </p:par>
+                              <p:par>
+                                <p:cTn id="21" presetID="6" presetClass="emph" presetSubtype="0" repeatCount="indefinite" accel="50000" decel="50000" autoRev="1" fill="hold" grpId="0" nodeType="withEffect">
+                                  <p:stCondLst>
+                                    <p:cond delay="0"/>
+                                  </p:stCondLst>
+                                  <p:childTnLst>
+                                    <p:animScale>
+                                      <p:cBhvr>
+                                        <p:cTn id="22" dur="4000" fill="hold"/>
+                                        <p:tgtEl>
+                                          <p:spTgt spid="4"/>
+                                        </p:tgtEl>
+                                      </p:cBhvr>
+                                      <p:by x="150000" y="150000"/>
+                                    </p:animScale>
+                                  </p:childTnLst>
+                                </p:cTn>
+                              </p:par>
+                            </p:childTnLst>
+                          </p:cTn>
+                        </p:par>
+                      </p:childTnLst>
+                    </p:cTn>
+                  </p:par>
+                </p:childTnLst>
+              </p:cTn>
+              <p:prevCondLst>
+                <p:cond evt="onPrev" delay="0">
+                  <p:tgtEl>
+                    <p:sldTgt/>
+                  </p:tgtEl>
+                </p:cond>
+              </p:prevCondLst>
+              <p:nextCondLst>
+                <p:cond evt="onNext" delay="0">
+                  <p:tgtEl>
+                    <p:sldTgt/>
+                  </p:tgtEl>
+                </p:cond>
+              </p:nextCondLst>
+            </p:seq>
+          </p:childTnLst>
+        </p:cTn>
+      </p:par>
+    </p:tnLst>
+    <p:bldLst>
+      <p:bldP spid="4" grpId="0" animBg="1"/>
+      <p:bldP spid="9" grpId="0" animBg="1"/>
+      <p:bldP spid="9" grpId="1" animBg="1"/>
+      <p:bldP spid="10" grpId="0" animBg="1"/>
+      <p:bldP spid="10" grpId="1" animBg="1"/>
+      <p:bldP spid="11" grpId="0" animBg="1"/>
+      <p:bldP spid="11" grpId="1" animBg="1"/>
+      <p:bldP spid="13" grpId="0" animBg="1"/>
+      <p:bldP spid="13" grpId="1" animBg="1"/>
+    </p:bldLst>
+  </p:timing>
+</p:sld>
+</file>
+
+<file path=ppt/slides/slide10.xml><?xml version="1.0" encoding="utf-8"?>
+<p:sld xmlns:a="http://schemas.openxmlformats.org/drawingml/2006/main" xmlns:r="http://schemas.openxmlformats.org/officeDocument/2006/relationships" xmlns:p="http://schemas.openxmlformats.org/presentationml/2006/main">
+  <p:cSld>
     <p:spTree>
       <p:nvGrpSpPr>
         <p:cNvPr id="1" name=""/>
@@ -5649,7 +6450,7 @@
           <p:cNvPr id="2" name="Title 1">
             <a:extLst>
               <a:ext uri="{FF2B5EF4-FFF2-40B4-BE49-F238E27FC236}">
-                <a16:creationId xmlns:a16="http://schemas.microsoft.com/office/drawing/2014/main" id="{115CC45D-BAD7-4666-82FB-740DE29F5D6F}"/>
+                <a16:creationId xmlns:a16="http://schemas.microsoft.com/office/drawing/2014/main" id="{FB5AFFC8-F0A6-4334-81E0-BFA0B3F0C3E5}"/>
               </a:ext>
             </a:extLst>
           </p:cNvPr>
@@ -5657,114 +6458,189 @@
             <a:spLocks noGrp="1"/>
           </p:cNvSpPr>
           <p:nvPr>
-            <p:ph type="ctrTitle"/>
+            <p:ph type="title"/>
           </p:nvPr>
         </p:nvSpPr>
-        <p:spPr/>
+        <p:spPr>
+          <a:xfrm>
+            <a:off x="913795" y="609600"/>
+            <a:ext cx="7247633" cy="1326321"/>
+          </a:xfrm>
+        </p:spPr>
         <p:txBody>
           <a:bodyPr/>
           <a:lstStyle/>
           <a:p>
             <a:r>
               <a:rPr lang="en-US" b="1" dirty="0"/>
-              <a:t>Floating</a:t>
-            </a:r>
-            <a:r>
-              <a:rPr lang="vi-VN" b="1" dirty="0"/>
-              <a:t>-</a:t>
-            </a:r>
-            <a:r>
-              <a:rPr lang="en-US" b="1" dirty="0"/>
-              <a:t>Point Square</a:t>
-            </a:r>
-            <a:r>
-              <a:rPr lang="vi-VN" b="1" dirty="0"/>
-              <a:t> </a:t>
-            </a:r>
-            <a:r>
-              <a:rPr lang="en-US" b="1" dirty="0"/>
-              <a:t>root</a:t>
+              <a:t>3. Controller (FSM)</a:t>
             </a:r>
           </a:p>
         </p:txBody>
       </p:sp>
       <p:sp>
         <p:nvSpPr>
-          <p:cNvPr id="3" name="Subtitle 2">
+          <p:cNvPr id="8" name="TextBox 7">
             <a:extLst>
               <a:ext uri="{FF2B5EF4-FFF2-40B4-BE49-F238E27FC236}">
-                <a16:creationId xmlns:a16="http://schemas.microsoft.com/office/drawing/2014/main" id="{F9C778D3-763C-48D7-9C67-A853A37F13D5}"/>
+                <a16:creationId xmlns:a16="http://schemas.microsoft.com/office/drawing/2014/main" id="{81046DE5-B7A7-479C-828E-A25D4455D549}"/>
               </a:ext>
             </a:extLst>
           </p:cNvPr>
-          <p:cNvSpPr>
-            <a:spLocks noGrp="1"/>
-          </p:cNvSpPr>
-          <p:nvPr>
-            <p:ph type="subTitle" idx="1"/>
-          </p:nvPr>
+          <p:cNvSpPr txBox="1"/>
+          <p:nvPr/>
         </p:nvSpPr>
-        <p:spPr/>
+        <p:spPr>
+          <a:xfrm>
+            <a:off x="838201" y="2126294"/>
+            <a:ext cx="7323228" cy="2677656"/>
+          </a:xfrm>
+          <a:prstGeom prst="rect">
+            <a:avLst/>
+          </a:prstGeom>
+          <a:noFill/>
+        </p:spPr>
         <p:txBody>
-          <a:bodyPr/>
+          <a:bodyPr wrap="square">
+            <a:spAutoFit/>
+          </a:bodyPr>
           <a:lstStyle/>
           <a:p>
+            <a:pPr algn="l"/>
             <a:r>
-              <a:rPr lang="en-US" b="1" dirty="0"/>
-              <a:t>Team members:</a:t>
+              <a:rPr lang="en-US" sz="2400" b="0" i="0" dirty="0">
+                <a:effectLst/>
+                <a:latin typeface="-apple-system"/>
+              </a:rPr>
+              <a:t>We need 8 register files:</a:t>
             </a:r>
           </a:p>
           <a:p>
+            <a:pPr marL="342900" indent="-342900" algn="l">
+              <a:buFont typeface="Arial" panose="020B0604020202020204" pitchFamily="34" charset="0"/>
+              <a:buChar char="•"/>
+            </a:pPr>
             <a:r>
-              <a:rPr lang="en-US" dirty="0"/>
-              <a:t>Hồ </a:t>
+              <a:rPr lang="en-US" sz="2400" dirty="0">
+                <a:latin typeface="-apple-system"/>
+              </a:rPr>
+              <a:t>RF[0] = 0</a:t>
+            </a:r>
+          </a:p>
+          <a:p>
+            <a:pPr marL="342900" indent="-342900" algn="l">
+              <a:buFont typeface="Arial" panose="020B0604020202020204" pitchFamily="34" charset="0"/>
+              <a:buChar char="•"/>
+            </a:pPr>
+            <a:r>
+              <a:rPr lang="en-US" sz="2400" b="0" i="0" dirty="0">
+                <a:effectLst/>
+                <a:latin typeface="-apple-system"/>
+              </a:rPr>
+              <a:t>RF[1] = </a:t>
             </a:r>
             <a:r>
-              <a:rPr lang="en-US" dirty="0" err="1"/>
-              <a:t>Hải</a:t>
+              <a:rPr lang="en-US" sz="2400" dirty="0">
+                <a:latin typeface="-apple-system"/>
+              </a:rPr>
+              <a:t>n</a:t>
             </a:r>
-            <a:r>
-              <a:rPr lang="en-US" dirty="0"/>
-              <a:t> Công </a:t>
-            </a:r>
-            <a:r>
-              <a:rPr lang="en-US" dirty="0" err="1"/>
-              <a:t>Thuận</a:t>
-            </a:r>
-            <a:r>
-              <a:rPr lang="en-US" dirty="0"/>
-              <a:t> – 1852</a:t>
-            </a:r>
-            <a:r>
-              <a:rPr lang="vi-VN" dirty="0"/>
-              <a:t>1469</a:t>
-            </a:r>
-            <a:endParaRPr lang="en-US" dirty="0"/>
           </a:p>
           <a:p>
+            <a:pPr marL="342900" indent="-342900" algn="l">
+              <a:buFont typeface="Arial" panose="020B0604020202020204" pitchFamily="34" charset="0"/>
+              <a:buChar char="•"/>
+            </a:pPr>
             <a:r>
-              <a:rPr lang="en-US" dirty="0" err="1"/>
-              <a:t>Hà</a:t>
+              <a:rPr lang="en-US" sz="2400" b="0" i="0" dirty="0">
+                <a:effectLst/>
+                <a:latin typeface="-apple-system"/>
+              </a:rPr>
+              <a:t>RF[2] = x</a:t>
             </a:r>
+          </a:p>
+          <a:p>
+            <a:pPr marL="342900" indent="-342900" algn="l">
+              <a:buFont typeface="Arial" panose="020B0604020202020204" pitchFamily="34" charset="0"/>
+              <a:buChar char="•"/>
+            </a:pPr>
             <a:r>
-              <a:rPr lang="en-US" dirty="0"/>
-              <a:t> </a:t>
+              <a:rPr lang="en-US" sz="2400" dirty="0">
+                <a:latin typeface="-apple-system"/>
+              </a:rPr>
+              <a:t>RF[3] = root</a:t>
             </a:r>
+          </a:p>
+          <a:p>
+            <a:pPr marL="342900" indent="-342900" algn="l">
+              <a:buFont typeface="Arial" panose="020B0604020202020204" pitchFamily="34" charset="0"/>
+              <a:buChar char="•"/>
+            </a:pPr>
             <a:r>
-              <a:rPr lang="en-US" dirty="0" err="1"/>
-              <a:t>Kiều</a:t>
+              <a:rPr lang="en-US" sz="2400" dirty="0">
+                <a:latin typeface="-apple-system"/>
+              </a:rPr>
+              <a:t>RF[4] = 2</a:t>
             </a:r>
+          </a:p>
+          <a:p>
+            <a:pPr marL="342900" indent="-342900" algn="l">
+              <a:buFont typeface="Arial" panose="020B0604020202020204" pitchFamily="34" charset="0"/>
+              <a:buChar char="•"/>
+            </a:pPr>
             <a:r>
-              <a:rPr lang="en-US" dirty="0"/>
-              <a:t> Trang – 18521522</a:t>
+              <a:rPr lang="en-US" sz="2400" dirty="0">
+                <a:latin typeface="-apple-system"/>
+              </a:rPr>
+              <a:t>RF[5] = result</a:t>
             </a:r>
+            <a:endParaRPr lang="en-US" sz="2400" b="0" i="0" dirty="0">
+              <a:effectLst/>
+              <a:latin typeface="-apple-system"/>
+            </a:endParaRPr>
           </a:p>
         </p:txBody>
       </p:sp>
+      <p:pic>
+        <p:nvPicPr>
+          <p:cNvPr id="6" name="Picture 5">
+            <a:extLst>
+              <a:ext uri="{FF2B5EF4-FFF2-40B4-BE49-F238E27FC236}">
+                <a16:creationId xmlns:a16="http://schemas.microsoft.com/office/drawing/2014/main" id="{EB63FA8E-C4C7-4559-8801-23E03AFBDC41}"/>
+              </a:ext>
+            </a:extLst>
+          </p:cNvPr>
+          <p:cNvPicPr>
+            <a:picLocks noChangeAspect="1"/>
+          </p:cNvPicPr>
+          <p:nvPr/>
+        </p:nvPicPr>
+        <p:blipFill>
+          <a:blip r:embed="rId2">
+            <a:extLst>
+              <a:ext uri="{28A0092B-C50C-407E-A947-70E740481C1C}">
+                <a14:useLocalDpi xmlns:a14="http://schemas.microsoft.com/office/drawing/2010/main" val="0"/>
+              </a:ext>
+            </a:extLst>
+          </a:blip>
+          <a:stretch>
+            <a:fillRect/>
+          </a:stretch>
+        </p:blipFill>
+        <p:spPr>
+          <a:xfrm>
+            <a:off x="8786013" y="0"/>
+            <a:ext cx="3405987" cy="6858000"/>
+          </a:xfrm>
+          <a:prstGeom prst="rect">
+            <a:avLst/>
+          </a:prstGeom>
+        </p:spPr>
+      </p:pic>
     </p:spTree>
     <p:extLst>
       <p:ext uri="{BB962C8B-B14F-4D97-AF65-F5344CB8AC3E}">
-        <p14:creationId xmlns:p14="http://schemas.microsoft.com/office/powerpoint/2010/main" val="2181784054"/>
+        <p14:creationId xmlns:p14="http://schemas.microsoft.com/office/powerpoint/2010/main" val="3930613559"/>
       </p:ext>
     </p:extLst>
   </p:cSld>
@@ -5786,7 +6662,7 @@
 </p:sld>
 </file>
 
-<file path=ppt/slides/slide10.xml><?xml version="1.0" encoding="utf-8"?>
+<file path=ppt/slides/slide11.xml><?xml version="1.0" encoding="utf-8"?>
 <p:sld xmlns:a="http://schemas.openxmlformats.org/drawingml/2006/main" xmlns:r="http://schemas.openxmlformats.org/officeDocument/2006/relationships" xmlns:p="http://schemas.openxmlformats.org/presentationml/2006/main">
   <p:cSld>
     <p:spTree>
@@ -7703,7 +8579,7 @@
 </p:sld>
 </file>
 
-<file path=ppt/slides/slide11.xml><?xml version="1.0" encoding="utf-8"?>
+<file path=ppt/slides/slide12.xml><?xml version="1.0" encoding="utf-8"?>
 <p:sld xmlns:a="http://schemas.openxmlformats.org/drawingml/2006/main" xmlns:r="http://schemas.openxmlformats.org/officeDocument/2006/relationships" xmlns:p="http://schemas.openxmlformats.org/presentationml/2006/main">
   <p:cSld>
     <p:spTree>
@@ -10312,7 +11188,7 @@
 </p:sld>
 </file>
 
-<file path=ppt/slides/slide12.xml><?xml version="1.0" encoding="utf-8"?>
+<file path=ppt/slides/slide13.xml><?xml version="1.0" encoding="utf-8"?>
 <p:sld xmlns:a="http://schemas.openxmlformats.org/drawingml/2006/main" xmlns:r="http://schemas.openxmlformats.org/officeDocument/2006/relationships" xmlns:p="http://schemas.openxmlformats.org/presentationml/2006/main">
   <p:cSld>
     <p:spTree>
@@ -11987,7 +12863,7 @@
 </p:sld>
 </file>
 
-<file path=ppt/slides/slide13.xml><?xml version="1.0" encoding="utf-8"?>
+<file path=ppt/slides/slide14.xml><?xml version="1.0" encoding="utf-8"?>
 <p:sld xmlns:a="http://schemas.openxmlformats.org/drawingml/2006/main" xmlns:r="http://schemas.openxmlformats.org/officeDocument/2006/relationships" xmlns:p="http://schemas.openxmlformats.org/presentationml/2006/main">
   <p:cSld>
     <p:spTree>
@@ -13560,7 +14436,7 @@
 </p:sld>
 </file>
 
-<file path=ppt/slides/slide14.xml><?xml version="1.0" encoding="utf-8"?>
+<file path=ppt/slides/slide15.xml><?xml version="1.0" encoding="utf-8"?>
 <p:sld xmlns:a="http://schemas.openxmlformats.org/drawingml/2006/main" xmlns:r="http://schemas.openxmlformats.org/officeDocument/2006/relationships" xmlns:p="http://schemas.openxmlformats.org/presentationml/2006/main">
   <p:cSld>
     <p:spTree>
@@ -13620,13 +14496,13 @@
           <p:nvPr>
             <p:extLst>
               <p:ext uri="{D42A27DB-BD31-4B8C-83A1-F6EECF244321}">
-                <p14:modId xmlns:p14="http://schemas.microsoft.com/office/powerpoint/2010/main" val="4089844911"/>
+                <p14:modId xmlns:p14="http://schemas.microsoft.com/office/powerpoint/2010/main" val="3230650952"/>
               </p:ext>
             </p:extLst>
           </p:nvPr>
         </p:nvGraphicFramePr>
         <p:xfrm>
-          <a:off x="838200" y="1577478"/>
+          <a:off x="832874" y="2320428"/>
           <a:ext cx="10515601" cy="3169920"/>
         </p:xfrm>
         <a:graphic>
@@ -13666,7 +14542,11 @@
                     <a:p>
                       <a:pPr algn="ctr"/>
                       <a:r>
-                        <a:rPr lang="en-US" sz="2400" dirty="0"/>
+                        <a:rPr lang="en-US" sz="2400" dirty="0">
+                          <a:solidFill>
+                            <a:schemeClr val="bg1"/>
+                          </a:solidFill>
+                        </a:rPr>
                         <a:t>STT</a:t>
                       </a:r>
                     </a:p>
@@ -13680,7 +14560,11 @@
                     <a:p>
                       <a:pPr algn="ctr"/>
                       <a:r>
-                        <a:rPr lang="en-US" sz="2400" dirty="0"/>
+                        <a:rPr lang="en-US" sz="2400" dirty="0">
+                          <a:solidFill>
+                            <a:schemeClr val="bg1"/>
+                          </a:solidFill>
+                        </a:rPr>
                         <a:t>Case name</a:t>
                       </a:r>
                     </a:p>
@@ -13694,15 +14578,27 @@
                     <a:p>
                       <a:pPr algn="ctr"/>
                       <a:r>
-                        <a:rPr lang="en-US" sz="1400" dirty="0"/>
+                        <a:rPr lang="en-US" sz="1400" dirty="0">
+                          <a:solidFill>
+                            <a:schemeClr val="bg1"/>
+                          </a:solidFill>
+                        </a:rPr>
                         <a:t>Longest time between input and output (</a:t>
                       </a:r>
                       <a:r>
-                        <a:rPr lang="en-US" sz="1400" dirty="0" err="1"/>
+                        <a:rPr lang="en-US" sz="1400" dirty="0" err="1">
+                          <a:solidFill>
+                            <a:schemeClr val="bg1"/>
+                          </a:solidFill>
+                        </a:rPr>
                         <a:t>ps</a:t>
                       </a:r>
                       <a:r>
-                        <a:rPr lang="en-US" sz="1400" dirty="0"/>
+                        <a:rPr lang="en-US" sz="1400" dirty="0">
+                          <a:solidFill>
+                            <a:schemeClr val="bg1"/>
+                          </a:solidFill>
+                        </a:rPr>
                         <a:t>)</a:t>
                       </a:r>
                     </a:p>
@@ -13723,7 +14619,11 @@
                     <a:p>
                       <a:pPr algn="ctr"/>
                       <a:r>
-                        <a:rPr lang="en-US" sz="2400" dirty="0"/>
+                        <a:rPr lang="en-US" sz="2400" dirty="0">
+                          <a:solidFill>
+                            <a:schemeClr val="bg1"/>
+                          </a:solidFill>
+                        </a:rPr>
                         <a:t>1</a:t>
                       </a:r>
                     </a:p>
@@ -13737,15 +14637,27 @@
                     <a:p>
                       <a:pPr algn="ctr"/>
                       <a:r>
-                        <a:rPr lang="en-US" sz="2400" dirty="0"/>
+                        <a:rPr lang="en-US" sz="2400" dirty="0">
+                          <a:solidFill>
+                            <a:schemeClr val="bg1"/>
+                          </a:solidFill>
+                        </a:rPr>
                         <a:t>Input = x.0 (</a:t>
                       </a:r>
                       <a:r>
-                        <a:rPr lang="en-US" sz="2400" dirty="0" err="1"/>
+                        <a:rPr lang="en-US" sz="2400" dirty="0" err="1">
+                          <a:solidFill>
+                            <a:schemeClr val="bg1"/>
+                          </a:solidFill>
+                        </a:rPr>
                         <a:t>eg</a:t>
                       </a:r>
                       <a:r>
-                        <a:rPr lang="en-US" sz="2400" dirty="0"/>
+                        <a:rPr lang="en-US" sz="2400" dirty="0">
+                          <a:solidFill>
+                            <a:schemeClr val="bg1"/>
+                          </a:solidFill>
+                        </a:rPr>
                         <a:t> 1.0, 2.0,…)</a:t>
                       </a:r>
                     </a:p>
@@ -13759,7 +14671,11 @@
                     <a:p>
                       <a:pPr algn="ctr"/>
                       <a:r>
-                        <a:rPr lang="en-US" sz="2400" dirty="0"/>
+                        <a:rPr lang="en-US" sz="2400" dirty="0">
+                          <a:solidFill>
+                            <a:schemeClr val="bg1"/>
+                          </a:solidFill>
+                        </a:rPr>
                         <a:t>28414</a:t>
                       </a:r>
                     </a:p>
@@ -13780,7 +14696,11 @@
                     <a:p>
                       <a:pPr algn="ctr"/>
                       <a:r>
-                        <a:rPr lang="en-US" sz="2400" dirty="0"/>
+                        <a:rPr lang="en-US" sz="2400" dirty="0">
+                          <a:solidFill>
+                            <a:schemeClr val="bg1"/>
+                          </a:solidFill>
+                        </a:rPr>
                         <a:t>2</a:t>
                       </a:r>
                     </a:p>
@@ -13794,15 +14714,27 @@
                     <a:p>
                       <a:pPr algn="ctr"/>
                       <a:r>
-                        <a:rPr lang="en-US" sz="2400" dirty="0"/>
+                        <a:rPr lang="en-US" sz="2400" dirty="0">
+                          <a:solidFill>
+                            <a:schemeClr val="bg1"/>
+                          </a:solidFill>
+                        </a:rPr>
                         <a:t>Input =  x.0y (</a:t>
                       </a:r>
                       <a:r>
-                        <a:rPr lang="en-US" sz="2400" dirty="0" err="1"/>
+                        <a:rPr lang="en-US" sz="2400" dirty="0" err="1">
+                          <a:solidFill>
+                            <a:schemeClr val="bg1"/>
+                          </a:solidFill>
+                        </a:rPr>
                         <a:t>eg</a:t>
                       </a:r>
                       <a:r>
-                        <a:rPr lang="en-US" sz="2400" dirty="0"/>
+                        <a:rPr lang="en-US" sz="2400" dirty="0">
+                          <a:solidFill>
+                            <a:schemeClr val="bg1"/>
+                          </a:solidFill>
+                        </a:rPr>
                         <a:t> 1.01, 1.02,…)</a:t>
                       </a:r>
                     </a:p>
@@ -13816,7 +14748,11 @@
                     <a:p>
                       <a:pPr algn="ctr"/>
                       <a:r>
-                        <a:rPr lang="en-US" sz="2400" dirty="0"/>
+                        <a:rPr lang="en-US" sz="2400" dirty="0">
+                          <a:solidFill>
+                            <a:schemeClr val="bg1"/>
+                          </a:solidFill>
+                        </a:rPr>
                         <a:t>23930</a:t>
                       </a:r>
                     </a:p>
@@ -13837,7 +14773,11 @@
                     <a:p>
                       <a:pPr algn="ctr"/>
                       <a:r>
-                        <a:rPr lang="en-US" sz="2400" dirty="0"/>
+                        <a:rPr lang="en-US" sz="2400" dirty="0">
+                          <a:solidFill>
+                            <a:schemeClr val="bg1"/>
+                          </a:solidFill>
+                        </a:rPr>
                         <a:t>3</a:t>
                       </a:r>
                     </a:p>
@@ -13851,15 +14791,27 @@
                     <a:p>
                       <a:pPr algn="ctr"/>
                       <a:r>
-                        <a:rPr lang="en-US" sz="2400" dirty="0"/>
+                        <a:rPr lang="en-US" sz="2400" dirty="0">
+                          <a:solidFill>
+                            <a:schemeClr val="bg1"/>
+                          </a:solidFill>
+                        </a:rPr>
                         <a:t>Input = x.00y (</a:t>
                       </a:r>
                       <a:r>
-                        <a:rPr lang="en-US" sz="2400" dirty="0" err="1"/>
+                        <a:rPr lang="en-US" sz="2400" dirty="0" err="1">
+                          <a:solidFill>
+                            <a:schemeClr val="bg1"/>
+                          </a:solidFill>
+                        </a:rPr>
                         <a:t>eg</a:t>
                       </a:r>
                       <a:r>
-                        <a:rPr lang="en-US" sz="2400" dirty="0"/>
+                        <a:rPr lang="en-US" sz="2400" dirty="0">
+                          <a:solidFill>
+                            <a:schemeClr val="bg1"/>
+                          </a:solidFill>
+                        </a:rPr>
                         <a:t> 1.001, 1.002,…)</a:t>
                       </a:r>
                     </a:p>
@@ -13872,7 +14824,11 @@
                     <a:lstStyle/>
                     <a:p>
                       <a:pPr algn="ctr"/>
-                      <a:endParaRPr lang="en-US" sz="2400" dirty="0"/>
+                      <a:endParaRPr lang="en-US" sz="2400" dirty="0">
+                        <a:solidFill>
+                          <a:schemeClr val="bg1"/>
+                        </a:solidFill>
+                      </a:endParaRPr>
                     </a:p>
                   </a:txBody>
                   <a:tcPr anchor="ctr"/>
@@ -13891,7 +14847,11 @@
                     <a:p>
                       <a:pPr algn="ctr"/>
                       <a:r>
-                        <a:rPr lang="en-US" sz="2400" dirty="0"/>
+                        <a:rPr lang="en-US" sz="2400" dirty="0">
+                          <a:solidFill>
+                            <a:schemeClr val="bg1"/>
+                          </a:solidFill>
+                        </a:rPr>
                         <a:t>4</a:t>
                       </a:r>
                     </a:p>
@@ -13905,15 +14865,27 @@
                     <a:p>
                       <a:pPr algn="ctr"/>
                       <a:r>
-                        <a:rPr lang="en-US" sz="2400" dirty="0"/>
+                        <a:rPr lang="en-US" sz="2400" dirty="0">
+                          <a:solidFill>
+                            <a:schemeClr val="bg1"/>
+                          </a:solidFill>
+                        </a:rPr>
                         <a:t>Input = x.000y (</a:t>
                       </a:r>
                       <a:r>
-                        <a:rPr lang="en-US" sz="2400" dirty="0" err="1"/>
+                        <a:rPr lang="en-US" sz="2400" dirty="0" err="1">
+                          <a:solidFill>
+                            <a:schemeClr val="bg1"/>
+                          </a:solidFill>
+                        </a:rPr>
                         <a:t>eg</a:t>
                       </a:r>
                       <a:r>
-                        <a:rPr lang="en-US" sz="2400" dirty="0"/>
+                        <a:rPr lang="en-US" sz="2400" dirty="0">
+                          <a:solidFill>
+                            <a:schemeClr val="bg1"/>
+                          </a:solidFill>
+                        </a:rPr>
                         <a:t> 1.0001, 1.0002…)</a:t>
                       </a:r>
                     </a:p>
@@ -13926,7 +14898,11 @@
                     <a:lstStyle/>
                     <a:p>
                       <a:pPr algn="ctr"/>
-                      <a:endParaRPr lang="en-US" sz="2400" dirty="0"/>
+                      <a:endParaRPr lang="en-US" sz="2400" dirty="0">
+                        <a:solidFill>
+                          <a:schemeClr val="bg1"/>
+                        </a:solidFill>
+                      </a:endParaRPr>
                     </a:p>
                   </a:txBody>
                   <a:tcPr anchor="ctr"/>
@@ -13945,7 +14921,11 @@
                     <a:p>
                       <a:pPr algn="ctr"/>
                       <a:r>
-                        <a:rPr lang="en-US" sz="2400" dirty="0"/>
+                        <a:rPr lang="en-US" sz="2400" dirty="0">
+                          <a:solidFill>
+                            <a:schemeClr val="bg1"/>
+                          </a:solidFill>
+                        </a:rPr>
                         <a:t>5</a:t>
                       </a:r>
                     </a:p>
@@ -13959,15 +14939,27 @@
                     <a:p>
                       <a:pPr algn="ctr"/>
                       <a:r>
-                        <a:rPr lang="en-US" sz="2400" dirty="0"/>
+                        <a:rPr lang="en-US" sz="2400" dirty="0">
+                          <a:solidFill>
+                            <a:schemeClr val="bg1"/>
+                          </a:solidFill>
+                        </a:rPr>
                         <a:t>Input = -x.0 (</a:t>
                       </a:r>
                       <a:r>
-                        <a:rPr lang="en-US" sz="2400" dirty="0" err="1"/>
+                        <a:rPr lang="en-US" sz="2400" dirty="0" err="1">
+                          <a:solidFill>
+                            <a:schemeClr val="bg1"/>
+                          </a:solidFill>
+                        </a:rPr>
                         <a:t>eg</a:t>
                       </a:r>
                       <a:r>
-                        <a:rPr lang="en-US" sz="2400" dirty="0"/>
+                        <a:rPr lang="en-US" sz="2400" dirty="0">
+                          <a:solidFill>
+                            <a:schemeClr val="bg1"/>
+                          </a:solidFill>
+                        </a:rPr>
                         <a:t> -1.0, -2.0,…)</a:t>
                       </a:r>
                     </a:p>
@@ -13980,7 +14972,11 @@
                     <a:lstStyle/>
                     <a:p>
                       <a:pPr algn="ctr"/>
-                      <a:endParaRPr lang="en-US" sz="2400" dirty="0"/>
+                      <a:endParaRPr lang="en-US" sz="2400" dirty="0">
+                        <a:solidFill>
+                          <a:schemeClr val="bg1"/>
+                        </a:solidFill>
+                      </a:endParaRPr>
                     </a:p>
                   </a:txBody>
                   <a:tcPr anchor="ctr"/>
@@ -13995,333 +14991,6 @@
           </a:graphicData>
         </a:graphic>
       </p:graphicFrame>
-      <mc:AlternateContent xmlns:mc="http://schemas.openxmlformats.org/markup-compatibility/2006" xmlns:a14="http://schemas.microsoft.com/office/drawing/2010/main">
-        <mc:Choice Requires="a14">
-          <p:sp>
-            <p:nvSpPr>
-              <p:cNvPr id="5" name="Content Placeholder 9">
-                <a:extLst>
-                  <a:ext uri="{FF2B5EF4-FFF2-40B4-BE49-F238E27FC236}">
-                    <a16:creationId xmlns:a16="http://schemas.microsoft.com/office/drawing/2014/main" id="{48F87FC3-29A0-4F32-924D-F2F60DC11C62}"/>
-                  </a:ext>
-                </a:extLst>
-              </p:cNvPr>
-              <p:cNvSpPr txBox="1">
-                <a:spLocks/>
-              </p:cNvSpPr>
-              <p:nvPr/>
-            </p:nvSpPr>
-            <p:spPr>
-              <a:xfrm>
-                <a:off x="838200" y="4686438"/>
-                <a:ext cx="10515600" cy="1806437"/>
-              </a:xfrm>
-              <a:prstGeom prst="rect">
-                <a:avLst/>
-              </a:prstGeom>
-            </p:spPr>
-            <p:txBody>
-              <a:bodyPr vert="horz" lIns="91440" tIns="45720" rIns="91440" bIns="45720" rtlCol="0">
-                <a:noAutofit/>
-              </a:bodyPr>
-              <a:lstStyle>
-                <a:lvl1pPr marL="228600" indent="-228600" algn="l" defTabSz="914400" rtl="0" eaLnBrk="1" latinLnBrk="0" hangingPunct="1">
-                  <a:lnSpc>
-                    <a:spcPct val="90000"/>
-                  </a:lnSpc>
-                  <a:spcBef>
-                    <a:spcPts val="1000"/>
-                  </a:spcBef>
-                  <a:buFont typeface="Arial" panose="020B0604020202020204" pitchFamily="34" charset="0"/>
-                  <a:buChar char="•"/>
-                  <a:defRPr sz="2800" kern="1200">
-                    <a:solidFill>
-                      <a:schemeClr val="tx1"/>
-                    </a:solidFill>
-                    <a:latin typeface="+mn-lt"/>
-                    <a:ea typeface="+mn-ea"/>
-                    <a:cs typeface="+mn-cs"/>
-                  </a:defRPr>
-                </a:lvl1pPr>
-                <a:lvl2pPr marL="685800" indent="-228600" algn="l" defTabSz="914400" rtl="0" eaLnBrk="1" latinLnBrk="0" hangingPunct="1">
-                  <a:lnSpc>
-                    <a:spcPct val="90000"/>
-                  </a:lnSpc>
-                  <a:spcBef>
-                    <a:spcPts val="500"/>
-                  </a:spcBef>
-                  <a:buFont typeface="Arial" panose="020B0604020202020204" pitchFamily="34" charset="0"/>
-                  <a:buChar char="•"/>
-                  <a:defRPr sz="2400" kern="1200">
-                    <a:solidFill>
-                      <a:schemeClr val="tx1"/>
-                    </a:solidFill>
-                    <a:latin typeface="+mn-lt"/>
-                    <a:ea typeface="+mn-ea"/>
-                    <a:cs typeface="+mn-cs"/>
-                  </a:defRPr>
-                </a:lvl2pPr>
-                <a:lvl3pPr marL="1143000" indent="-228600" algn="l" defTabSz="914400" rtl="0" eaLnBrk="1" latinLnBrk="0" hangingPunct="1">
-                  <a:lnSpc>
-                    <a:spcPct val="90000"/>
-                  </a:lnSpc>
-                  <a:spcBef>
-                    <a:spcPts val="500"/>
-                  </a:spcBef>
-                  <a:buFont typeface="Arial" panose="020B0604020202020204" pitchFamily="34" charset="0"/>
-                  <a:buChar char="•"/>
-                  <a:defRPr sz="2000" kern="1200">
-                    <a:solidFill>
-                      <a:schemeClr val="tx1"/>
-                    </a:solidFill>
-                    <a:latin typeface="+mn-lt"/>
-                    <a:ea typeface="+mn-ea"/>
-                    <a:cs typeface="+mn-cs"/>
-                  </a:defRPr>
-                </a:lvl3pPr>
-                <a:lvl4pPr marL="1600200" indent="-228600" algn="l" defTabSz="914400" rtl="0" eaLnBrk="1" latinLnBrk="0" hangingPunct="1">
-                  <a:lnSpc>
-                    <a:spcPct val="90000"/>
-                  </a:lnSpc>
-                  <a:spcBef>
-                    <a:spcPts val="500"/>
-                  </a:spcBef>
-                  <a:buFont typeface="Arial" panose="020B0604020202020204" pitchFamily="34" charset="0"/>
-                  <a:buChar char="•"/>
-                  <a:defRPr sz="1800" kern="1200">
-                    <a:solidFill>
-                      <a:schemeClr val="tx1"/>
-                    </a:solidFill>
-                    <a:latin typeface="+mn-lt"/>
-                    <a:ea typeface="+mn-ea"/>
-                    <a:cs typeface="+mn-cs"/>
-                  </a:defRPr>
-                </a:lvl4pPr>
-                <a:lvl5pPr marL="2057400" indent="-228600" algn="l" defTabSz="914400" rtl="0" eaLnBrk="1" latinLnBrk="0" hangingPunct="1">
-                  <a:lnSpc>
-                    <a:spcPct val="90000"/>
-                  </a:lnSpc>
-                  <a:spcBef>
-                    <a:spcPts val="500"/>
-                  </a:spcBef>
-                  <a:buFont typeface="Arial" panose="020B0604020202020204" pitchFamily="34" charset="0"/>
-                  <a:buChar char="•"/>
-                  <a:defRPr sz="1800" kern="1200">
-                    <a:solidFill>
-                      <a:schemeClr val="tx1"/>
-                    </a:solidFill>
-                    <a:latin typeface="+mn-lt"/>
-                    <a:ea typeface="+mn-ea"/>
-                    <a:cs typeface="+mn-cs"/>
-                  </a:defRPr>
-                </a:lvl5pPr>
-                <a:lvl6pPr marL="2514600" indent="-228600" algn="l" defTabSz="914400" rtl="0" eaLnBrk="1" latinLnBrk="0" hangingPunct="1">
-                  <a:lnSpc>
-                    <a:spcPct val="90000"/>
-                  </a:lnSpc>
-                  <a:spcBef>
-                    <a:spcPts val="500"/>
-                  </a:spcBef>
-                  <a:buFont typeface="Arial" panose="020B0604020202020204" pitchFamily="34" charset="0"/>
-                  <a:buChar char="•"/>
-                  <a:defRPr sz="1800" kern="1200">
-                    <a:solidFill>
-                      <a:schemeClr val="tx1"/>
-                    </a:solidFill>
-                    <a:latin typeface="+mn-lt"/>
-                    <a:ea typeface="+mn-ea"/>
-                    <a:cs typeface="+mn-cs"/>
-                  </a:defRPr>
-                </a:lvl6pPr>
-                <a:lvl7pPr marL="2971800" indent="-228600" algn="l" defTabSz="914400" rtl="0" eaLnBrk="1" latinLnBrk="0" hangingPunct="1">
-                  <a:lnSpc>
-                    <a:spcPct val="90000"/>
-                  </a:lnSpc>
-                  <a:spcBef>
-                    <a:spcPts val="500"/>
-                  </a:spcBef>
-                  <a:buFont typeface="Arial" panose="020B0604020202020204" pitchFamily="34" charset="0"/>
-                  <a:buChar char="•"/>
-                  <a:defRPr sz="1800" kern="1200">
-                    <a:solidFill>
-                      <a:schemeClr val="tx1"/>
-                    </a:solidFill>
-                    <a:latin typeface="+mn-lt"/>
-                    <a:ea typeface="+mn-ea"/>
-                    <a:cs typeface="+mn-cs"/>
-                  </a:defRPr>
-                </a:lvl7pPr>
-                <a:lvl8pPr marL="3429000" indent="-228600" algn="l" defTabSz="914400" rtl="0" eaLnBrk="1" latinLnBrk="0" hangingPunct="1">
-                  <a:lnSpc>
-                    <a:spcPct val="90000"/>
-                  </a:lnSpc>
-                  <a:spcBef>
-                    <a:spcPts val="500"/>
-                  </a:spcBef>
-                  <a:buFont typeface="Arial" panose="020B0604020202020204" pitchFamily="34" charset="0"/>
-                  <a:buChar char="•"/>
-                  <a:defRPr sz="1800" kern="1200">
-                    <a:solidFill>
-                      <a:schemeClr val="tx1"/>
-                    </a:solidFill>
-                    <a:latin typeface="+mn-lt"/>
-                    <a:ea typeface="+mn-ea"/>
-                    <a:cs typeface="+mn-cs"/>
-                  </a:defRPr>
-                </a:lvl8pPr>
-                <a:lvl9pPr marL="3886200" indent="-228600" algn="l" defTabSz="914400" rtl="0" eaLnBrk="1" latinLnBrk="0" hangingPunct="1">
-                  <a:lnSpc>
-                    <a:spcPct val="90000"/>
-                  </a:lnSpc>
-                  <a:spcBef>
-                    <a:spcPts val="500"/>
-                  </a:spcBef>
-                  <a:buFont typeface="Arial" panose="020B0604020202020204" pitchFamily="34" charset="0"/>
-                  <a:buChar char="•"/>
-                  <a:defRPr sz="1800" kern="1200">
-                    <a:solidFill>
-                      <a:schemeClr val="tx1"/>
-                    </a:solidFill>
-                    <a:latin typeface="+mn-lt"/>
-                    <a:ea typeface="+mn-ea"/>
-                    <a:cs typeface="+mn-cs"/>
-                  </a:defRPr>
-                </a:lvl9pPr>
-              </a:lstStyle>
-              <a:p>
-                <a:r>
-                  <a:rPr lang="en-US" sz="2400" dirty="0"/>
-                  <a:t>Frequency = 1 / Max(Longest time between input and output)</a:t>
-                </a:r>
-              </a:p>
-              <a:p>
-                <a:pPr marL="1828800" lvl="4" indent="0">
-                  <a:buNone/>
-                </a:pPr>
-                <a:r>
-                  <a:rPr lang="en-US" sz="2400" dirty="0"/>
-                  <a:t>=</a:t>
-                </a:r>
-                <a:r>
-                  <a:rPr lang="en-US" sz="2400" b="0" u="none" strike="noStrike" baseline="0" dirty="0"/>
-                  <a:t> </a:t>
-                </a:r>
-                <a14:m>
-                  <m:oMath xmlns:m="http://schemas.openxmlformats.org/officeDocument/2006/math">
-                    <m:f>
-                      <m:fPr>
-                        <m:ctrlPr>
-                          <a:rPr lang="en-US" sz="2400" b="0" i="1" u="none" strike="noStrike" baseline="0" smtClean="0">
-                            <a:latin typeface="Cambria Math" panose="02040503050406030204" pitchFamily="18" charset="0"/>
-                          </a:rPr>
-                        </m:ctrlPr>
-                      </m:fPr>
-                      <m:num>
-                        <m:r>
-                          <a:rPr lang="en-US" sz="2400" b="0" i="1" u="none" strike="noStrike" baseline="0" smtClean="0">
-                            <a:latin typeface="Cambria Math" panose="02040503050406030204" pitchFamily="18" charset="0"/>
-                          </a:rPr>
-                          <m:t>1</m:t>
-                        </m:r>
-                      </m:num>
-                      <m:den>
-                        <m:r>
-                          <a:rPr lang="en-US" sz="2400" b="0" i="1" u="none" strike="noStrike" baseline="0" smtClean="0">
-                            <a:latin typeface="Cambria Math" panose="02040503050406030204" pitchFamily="18" charset="0"/>
-                          </a:rPr>
-                          <m:t>28414 ∗</m:t>
-                        </m:r>
-                        <m:sSup>
-                          <m:sSupPr>
-                            <m:ctrlPr>
-                              <a:rPr lang="en-US" sz="2400" i="1">
-                                <a:latin typeface="Cambria Math" panose="02040503050406030204" pitchFamily="18" charset="0"/>
-                              </a:rPr>
-                            </m:ctrlPr>
-                          </m:sSupPr>
-                          <m:e>
-                            <m:r>
-                              <a:rPr lang="en-US" sz="2400" b="0" i="1" smtClean="0">
-                                <a:latin typeface="Cambria Math" panose="02040503050406030204" pitchFamily="18" charset="0"/>
-                              </a:rPr>
-                              <m:t>10</m:t>
-                            </m:r>
-                          </m:e>
-                          <m:sup>
-                            <m:r>
-                              <a:rPr lang="en-US" sz="2400" b="0" i="1" smtClean="0">
-                                <a:latin typeface="Cambria Math" panose="02040503050406030204" pitchFamily="18" charset="0"/>
-                              </a:rPr>
-                              <m:t>−12</m:t>
-                            </m:r>
-                          </m:sup>
-                        </m:sSup>
-                      </m:den>
-                    </m:f>
-                  </m:oMath>
-                </a14:m>
-                <a:r>
-                  <a:rPr lang="en-US" sz="2400" dirty="0"/>
-                  <a:t> = 35193918.49 (Hz)</a:t>
-                </a:r>
-              </a:p>
-              <a:p>
-                <a:endParaRPr lang="en-US" sz="2400" dirty="0"/>
-              </a:p>
-              <a:p>
-                <a:r>
-                  <a:rPr lang="en-US" sz="2400" dirty="0"/>
-                  <a:t>Number of cycle: 4</a:t>
-                </a:r>
-              </a:p>
-            </p:txBody>
-          </p:sp>
-        </mc:Choice>
-        <mc:Fallback xmlns="">
-          <p:sp>
-            <p:nvSpPr>
-              <p:cNvPr id="5" name="Content Placeholder 9">
-                <a:extLst>
-                  <a:ext uri="{FF2B5EF4-FFF2-40B4-BE49-F238E27FC236}">
-                    <a16:creationId xmlns:a16="http://schemas.microsoft.com/office/drawing/2014/main" id="{48F87FC3-29A0-4F32-924D-F2F60DC11C62}"/>
-                  </a:ext>
-                </a:extLst>
-              </p:cNvPr>
-              <p:cNvSpPr txBox="1">
-                <a:spLocks noRot="1" noChangeAspect="1" noMove="1" noResize="1" noEditPoints="1" noAdjustHandles="1" noChangeArrowheads="1" noChangeShapeType="1" noTextEdit="1"/>
-              </p:cNvSpPr>
-              <p:nvPr/>
-            </p:nvSpPr>
-            <p:spPr>
-              <a:xfrm>
-                <a:off x="838200" y="4686438"/>
-                <a:ext cx="10515600" cy="1806437"/>
-              </a:xfrm>
-              <a:prstGeom prst="rect">
-                <a:avLst/>
-              </a:prstGeom>
-              <a:blipFill>
-                <a:blip r:embed="rId2"/>
-                <a:stretch>
-                  <a:fillRect l="-812" t="-4730" b="-11149"/>
-                </a:stretch>
-              </a:blipFill>
-            </p:spPr>
-            <p:txBody>
-              <a:bodyPr/>
-              <a:lstStyle/>
-              <a:p>
-                <a:r>
-                  <a:rPr lang="en-US">
-                    <a:noFill/>
-                  </a:rPr>
-                  <a:t> </a:t>
-                </a:r>
-              </a:p>
-            </p:txBody>
-          </p:sp>
-        </mc:Fallback>
-      </mc:AlternateContent>
     </p:spTree>
     <p:extLst>
       <p:ext uri="{BB962C8B-B14F-4D97-AF65-F5344CB8AC3E}">
@@ -14347,7 +15016,7 @@
 </p:sld>
 </file>
 
-<file path=ppt/slides/slide15.xml><?xml version="1.0" encoding="utf-8"?>
+<file path=ppt/slides/slide16.xml><?xml version="1.0" encoding="utf-8"?>
 <p:sld xmlns:a="http://schemas.openxmlformats.org/drawingml/2006/main" xmlns:r="http://schemas.openxmlformats.org/officeDocument/2006/relationships" xmlns:p="http://schemas.openxmlformats.org/presentationml/2006/main">
   <p:cSld>
     <p:spTree>
@@ -14591,16 +15260,24 @@
                   <a:t>Frequency = 1 / Max</a:t>
                 </a:r>
                 <a:r>
-                  <a:rPr lang="vi-VN"/>
+                  <a:rPr lang="vi-VN" dirty="0"/>
                   <a:t> </a:t>
                 </a:r>
                 <a:r>
-                  <a:rPr lang="en-US"/>
+                  <a:rPr lang="en-US" dirty="0"/>
                   <a:t>(</a:t>
                 </a:r>
                 <a:r>
+                  <a:rPr lang="vi-VN" dirty="0"/>
+                  <a:t>the l</a:t>
+                </a:r>
+                <a:r>
+                  <a:rPr lang="en-US" dirty="0" err="1"/>
+                  <a:t>ongest</a:t>
+                </a:r>
+                <a:r>
                   <a:rPr lang="en-US" dirty="0"/>
-                  <a:t>Longest time between input and output)</a:t>
+                  <a:t> time between input and output)</a:t>
                 </a:r>
               </a:p>
               <a:p>
@@ -14620,47 +15297,35 @@
                     <m:f>
                       <m:fPr>
                         <m:ctrlPr>
-                          <a:rPr lang="en-US" sz="2800" b="0" i="1" u="none" strike="noStrike" baseline="0" smtClean="0">
-                            <a:latin typeface="Cambria Math" panose="02040503050406030204" pitchFamily="18" charset="0"/>
-                          </a:rPr>
+                          <a:rPr lang="en-US" sz="2800" b="0" i="1" u="none" strike="noStrike" baseline="0" smtClean="0"/>
                         </m:ctrlPr>
                       </m:fPr>
                       <m:num>
                         <m:r>
-                          <a:rPr lang="en-US" sz="2800" b="0" i="1" u="none" strike="noStrike" baseline="0" smtClean="0">
-                            <a:latin typeface="Cambria Math" panose="02040503050406030204" pitchFamily="18" charset="0"/>
-                          </a:rPr>
+                          <a:rPr lang="en-US" sz="2800" b="0" i="1" u="none" strike="noStrike" baseline="0" smtClean="0"/>
                           <m:t>1</m:t>
                         </m:r>
                       </m:num>
                       <m:den>
                         <m:r>
-                          <a:rPr lang="en-US" sz="2800" b="0" i="1" u="none" strike="noStrike" baseline="0" smtClean="0">
-                            <a:latin typeface="Cambria Math" panose="02040503050406030204" pitchFamily="18" charset="0"/>
-                          </a:rPr>
+                          <a:rPr lang="en-US" sz="2800" b="0" i="1" u="none" strike="noStrike" baseline="0" smtClean="0"/>
                           <m:t>28414 ∗</m:t>
                         </m:r>
                         <m:sSup>
                           <m:sSupPr>
                             <m:ctrlPr>
-                              <a:rPr lang="en-US" sz="2800" i="1">
-                                <a:latin typeface="Cambria Math" panose="02040503050406030204" pitchFamily="18" charset="0"/>
-                              </a:rPr>
+                              <a:rPr lang="en-US" sz="2800" i="1"/>
                             </m:ctrlPr>
                           </m:sSupPr>
                           <m:e>
                             <m:r>
-                              <a:rPr lang="en-US" sz="2800" b="0" i="1" smtClean="0">
-                                <a:latin typeface="Cambria Math" panose="02040503050406030204" pitchFamily="18" charset="0"/>
-                              </a:rPr>
+                              <a:rPr lang="en-US" sz="2800" b="0" i="1" smtClean="0"/>
                               <m:t>10</m:t>
                             </m:r>
                           </m:e>
                           <m:sup>
                             <m:r>
-                              <a:rPr lang="en-US" sz="2800" b="0" i="1" smtClean="0">
-                                <a:latin typeface="Cambria Math" panose="02040503050406030204" pitchFamily="18" charset="0"/>
-                              </a:rPr>
+                              <a:rPr lang="en-US" sz="2800" b="0" i="1" smtClean="0"/>
                               <m:t>−12</m:t>
                             </m:r>
                           </m:sup>
@@ -14712,7 +15377,7 @@
               <a:blipFill>
                 <a:blip r:embed="rId2"/>
                 <a:stretch>
-                  <a:fillRect l="-1043" t="-3755" r="-1159"/>
+                  <a:fillRect l="-1043" t="-3755"/>
                 </a:stretch>
               </a:blipFill>
             </p:spPr>
@@ -14756,7 +15421,7 @@
 </p:sld>
 </file>
 
-<file path=ppt/slides/slide16.xml><?xml version="1.0" encoding="utf-8"?>
+<file path=ppt/slides/slide17.xml><?xml version="1.0" encoding="utf-8"?>
 <p:sld xmlns:a="http://schemas.openxmlformats.org/drawingml/2006/main" xmlns:r="http://schemas.openxmlformats.org/officeDocument/2006/relationships" xmlns:p="http://schemas.openxmlformats.org/presentationml/2006/main" show="0">
   <p:cSld>
     <p:spTree>
@@ -16115,7 +16780,7 @@
 </p:sld>
 </file>
 
-<file path=ppt/slides/slide17.xml><?xml version="1.0" encoding="utf-8"?>
+<file path=ppt/slides/slide18.xml><?xml version="1.0" encoding="utf-8"?>
 <p:sld xmlns:a="http://schemas.openxmlformats.org/drawingml/2006/main" xmlns:r="http://schemas.openxmlformats.org/officeDocument/2006/relationships" xmlns:p="http://schemas.openxmlformats.org/presentationml/2006/main" show="0">
   <p:cSld>
     <p:spTree>
@@ -17453,7 +18118,7 @@
 </p:sld>
 </file>
 
-<file path=ppt/slides/slide18.xml><?xml version="1.0" encoding="utf-8"?>
+<file path=ppt/slides/slide19.xml><?xml version="1.0" encoding="utf-8"?>
 <p:sld xmlns:a="http://schemas.openxmlformats.org/drawingml/2006/main" xmlns:r="http://schemas.openxmlformats.org/officeDocument/2006/relationships" xmlns:p="http://schemas.openxmlformats.org/presentationml/2006/main" show="0">
   <p:cSld>
     <p:spTree>
@@ -18623,7 +19288,166 @@
 </p:sld>
 </file>
 
-<file path=ppt/slides/slide19.xml><?xml version="1.0" encoding="utf-8"?>
+<file path=ppt/slides/slide2.xml><?xml version="1.0" encoding="utf-8"?>
+<p:sld xmlns:a="http://schemas.openxmlformats.org/drawingml/2006/main" xmlns:r="http://schemas.openxmlformats.org/officeDocument/2006/relationships" xmlns:p="http://schemas.openxmlformats.org/presentationml/2006/main">
+  <p:cSld>
+    <p:spTree>
+      <p:nvGrpSpPr>
+        <p:cNvPr id="1" name=""/>
+        <p:cNvGrpSpPr/>
+        <p:nvPr/>
+      </p:nvGrpSpPr>
+      <p:grpSpPr>
+        <a:xfrm>
+          <a:off x="0" y="0"/>
+          <a:ext cx="0" cy="0"/>
+          <a:chOff x="0" y="0"/>
+          <a:chExt cx="0" cy="0"/>
+        </a:xfrm>
+      </p:grpSpPr>
+      <p:sp>
+        <p:nvSpPr>
+          <p:cNvPr id="2" name="Title 1">
+            <a:extLst>
+              <a:ext uri="{FF2B5EF4-FFF2-40B4-BE49-F238E27FC236}">
+                <a16:creationId xmlns:a16="http://schemas.microsoft.com/office/drawing/2014/main" id="{115CC45D-BAD7-4666-82FB-740DE29F5D6F}"/>
+              </a:ext>
+            </a:extLst>
+          </p:cNvPr>
+          <p:cNvSpPr>
+            <a:spLocks noGrp="1"/>
+          </p:cNvSpPr>
+          <p:nvPr>
+            <p:ph type="ctrTitle"/>
+          </p:nvPr>
+        </p:nvSpPr>
+        <p:spPr/>
+        <p:txBody>
+          <a:bodyPr/>
+          <a:lstStyle/>
+          <a:p>
+            <a:r>
+              <a:rPr lang="en-US" b="1" dirty="0"/>
+              <a:t>Floating</a:t>
+            </a:r>
+            <a:r>
+              <a:rPr lang="vi-VN" b="1" dirty="0"/>
+              <a:t>-</a:t>
+            </a:r>
+            <a:r>
+              <a:rPr lang="en-US" b="1" dirty="0"/>
+              <a:t>Point Square</a:t>
+            </a:r>
+            <a:r>
+              <a:rPr lang="vi-VN" b="1" dirty="0"/>
+              <a:t> </a:t>
+            </a:r>
+            <a:r>
+              <a:rPr lang="en-US" b="1" dirty="0"/>
+              <a:t>root</a:t>
+            </a:r>
+          </a:p>
+        </p:txBody>
+      </p:sp>
+      <p:sp>
+        <p:nvSpPr>
+          <p:cNvPr id="3" name="Subtitle 2">
+            <a:extLst>
+              <a:ext uri="{FF2B5EF4-FFF2-40B4-BE49-F238E27FC236}">
+                <a16:creationId xmlns:a16="http://schemas.microsoft.com/office/drawing/2014/main" id="{F9C778D3-763C-48D7-9C67-A853A37F13D5}"/>
+              </a:ext>
+            </a:extLst>
+          </p:cNvPr>
+          <p:cNvSpPr>
+            <a:spLocks noGrp="1"/>
+          </p:cNvSpPr>
+          <p:nvPr>
+            <p:ph type="subTitle" idx="1"/>
+          </p:nvPr>
+        </p:nvSpPr>
+        <p:spPr/>
+        <p:txBody>
+          <a:bodyPr/>
+          <a:lstStyle/>
+          <a:p>
+            <a:r>
+              <a:rPr lang="en-US" b="1" dirty="0"/>
+              <a:t>Team members:</a:t>
+            </a:r>
+          </a:p>
+          <a:p>
+            <a:r>
+              <a:rPr lang="en-US" dirty="0"/>
+              <a:t>Hồ </a:t>
+            </a:r>
+            <a:r>
+              <a:rPr lang="en-US" dirty="0" err="1"/>
+              <a:t>Hải</a:t>
+            </a:r>
+            <a:r>
+              <a:rPr lang="en-US" dirty="0"/>
+              <a:t> Công </a:t>
+            </a:r>
+            <a:r>
+              <a:rPr lang="en-US" dirty="0" err="1"/>
+              <a:t>Thuận</a:t>
+            </a:r>
+            <a:r>
+              <a:rPr lang="en-US" dirty="0"/>
+              <a:t> – 1852</a:t>
+            </a:r>
+            <a:r>
+              <a:rPr lang="vi-VN" dirty="0"/>
+              <a:t>1469</a:t>
+            </a:r>
+            <a:endParaRPr lang="en-US" dirty="0"/>
+          </a:p>
+          <a:p>
+            <a:r>
+              <a:rPr lang="en-US" dirty="0" err="1"/>
+              <a:t>Hà</a:t>
+            </a:r>
+            <a:r>
+              <a:rPr lang="en-US" dirty="0"/>
+              <a:t> </a:t>
+            </a:r>
+            <a:r>
+              <a:rPr lang="en-US" dirty="0" err="1"/>
+              <a:t>Kiều</a:t>
+            </a:r>
+            <a:r>
+              <a:rPr lang="en-US" dirty="0"/>
+              <a:t> Trang – 18521522</a:t>
+            </a:r>
+          </a:p>
+        </p:txBody>
+      </p:sp>
+    </p:spTree>
+    <p:extLst>
+      <p:ext uri="{BB962C8B-B14F-4D97-AF65-F5344CB8AC3E}">
+        <p14:creationId xmlns:p14="http://schemas.microsoft.com/office/powerpoint/2010/main" val="2181784054"/>
+      </p:ext>
+    </p:extLst>
+  </p:cSld>
+  <p:clrMapOvr>
+    <a:masterClrMapping/>
+  </p:clrMapOvr>
+  <mc:AlternateContent xmlns:mc="http://schemas.openxmlformats.org/markup-compatibility/2006">
+    <mc:Choice xmlns:p159="http://schemas.microsoft.com/office/powerpoint/2015/09/main" Requires="p159">
+      <p:transition xmlns:p14="http://schemas.microsoft.com/office/powerpoint/2010/main" spd="slow" p14:dur="2000">
+        <p159:morph option="byObject"/>
+      </p:transition>
+    </mc:Choice>
+    <mc:Fallback>
+      <p:transition spd="slow">
+        <p:fade/>
+      </p:transition>
+    </mc:Fallback>
+  </mc:AlternateContent>
+</p:sld>
+</file>
+
+<file path=ppt/slides/slide20.xml><?xml version="1.0" encoding="utf-8"?>
 <p:sld xmlns:a="http://schemas.openxmlformats.org/drawingml/2006/main" xmlns:r="http://schemas.openxmlformats.org/officeDocument/2006/relationships" xmlns:p="http://schemas.openxmlformats.org/presentationml/2006/main" show="0">
   <p:cSld>
     <p:spTree>
@@ -19961,149 +20785,7 @@
 </p:sld>
 </file>
 
-<file path=ppt/slides/slide2.xml><?xml version="1.0" encoding="utf-8"?>
-<p:sld xmlns:a="http://schemas.openxmlformats.org/drawingml/2006/main" xmlns:r="http://schemas.openxmlformats.org/officeDocument/2006/relationships" xmlns:p="http://schemas.openxmlformats.org/presentationml/2006/main">
-  <p:cSld>
-    <p:spTree>
-      <p:nvGrpSpPr>
-        <p:cNvPr id="1" name=""/>
-        <p:cNvGrpSpPr/>
-        <p:nvPr/>
-      </p:nvGrpSpPr>
-      <p:grpSpPr>
-        <a:xfrm>
-          <a:off x="0" y="0"/>
-          <a:ext cx="0" cy="0"/>
-          <a:chOff x="0" y="0"/>
-          <a:chExt cx="0" cy="0"/>
-        </a:xfrm>
-      </p:grpSpPr>
-      <p:sp>
-        <p:nvSpPr>
-          <p:cNvPr id="2" name="Title 1">
-            <a:extLst>
-              <a:ext uri="{FF2B5EF4-FFF2-40B4-BE49-F238E27FC236}">
-                <a16:creationId xmlns:a16="http://schemas.microsoft.com/office/drawing/2014/main" id="{AB647BBE-BD36-43B1-81DB-29235E8F0BBC}"/>
-              </a:ext>
-            </a:extLst>
-          </p:cNvPr>
-          <p:cNvSpPr>
-            <a:spLocks noGrp="1"/>
-          </p:cNvSpPr>
-          <p:nvPr>
-            <p:ph type="title"/>
-          </p:nvPr>
-        </p:nvSpPr>
-        <p:spPr>
-          <a:xfrm>
-            <a:off x="838200" y="1085611"/>
-            <a:ext cx="10515600" cy="1325563"/>
-          </a:xfrm>
-        </p:spPr>
-        <p:txBody>
-          <a:bodyPr>
-            <a:normAutofit/>
-          </a:bodyPr>
-          <a:lstStyle/>
-          <a:p>
-            <a:r>
-              <a:rPr lang="en-US" sz="6000" b="1" u="sng" dirty="0"/>
-              <a:t>Contents</a:t>
-            </a:r>
-          </a:p>
-        </p:txBody>
-      </p:sp>
-      <p:sp>
-        <p:nvSpPr>
-          <p:cNvPr id="3" name="Content Placeholder 2">
-            <a:extLst>
-              <a:ext uri="{FF2B5EF4-FFF2-40B4-BE49-F238E27FC236}">
-                <a16:creationId xmlns:a16="http://schemas.microsoft.com/office/drawing/2014/main" id="{3C0C28D4-A766-466C-884F-22D3C4A82CB8}"/>
-              </a:ext>
-            </a:extLst>
-          </p:cNvPr>
-          <p:cNvSpPr>
-            <a:spLocks noGrp="1"/>
-          </p:cNvSpPr>
-          <p:nvPr>
-            <p:ph idx="1"/>
-          </p:nvPr>
-        </p:nvSpPr>
-        <p:spPr>
-          <a:xfrm>
-            <a:off x="838200" y="2506662"/>
-            <a:ext cx="10515600" cy="3748364"/>
-          </a:xfrm>
-        </p:spPr>
-        <p:txBody>
-          <a:bodyPr>
-            <a:normAutofit/>
-          </a:bodyPr>
-          <a:lstStyle/>
-          <a:p>
-            <a:pPr marL="514350" indent="-514350" algn="ctr">
-              <a:buAutoNum type="arabicPeriod"/>
-            </a:pPr>
-            <a:r>
-              <a:rPr lang="en-US" sz="4000" dirty="0"/>
-              <a:t>Algorithm</a:t>
-            </a:r>
-          </a:p>
-          <a:p>
-            <a:pPr marL="514350" indent="-514350" algn="ctr">
-              <a:buAutoNum type="arabicPeriod"/>
-            </a:pPr>
-            <a:r>
-              <a:rPr lang="en-US" sz="4000" dirty="0"/>
-              <a:t>Datapath</a:t>
-            </a:r>
-          </a:p>
-          <a:p>
-            <a:pPr marL="514350" indent="-514350" algn="ctr">
-              <a:buAutoNum type="arabicPeriod"/>
-            </a:pPr>
-            <a:r>
-              <a:rPr lang="en-US" sz="4000" dirty="0"/>
-              <a:t>Controller (FSM)</a:t>
-            </a:r>
-          </a:p>
-          <a:p>
-            <a:pPr marL="514350" indent="-514350" algn="ctr">
-              <a:buAutoNum type="arabicPeriod"/>
-            </a:pPr>
-            <a:r>
-              <a:rPr lang="en-US" sz="4000" dirty="0"/>
-              <a:t>Simulation result</a:t>
-            </a:r>
-          </a:p>
-        </p:txBody>
-      </p:sp>
-    </p:spTree>
-    <p:extLst>
-      <p:ext uri="{BB962C8B-B14F-4D97-AF65-F5344CB8AC3E}">
-        <p14:creationId xmlns:p14="http://schemas.microsoft.com/office/powerpoint/2010/main" val="1174850043"/>
-      </p:ext>
-    </p:extLst>
-  </p:cSld>
-  <p:clrMapOvr>
-    <a:masterClrMapping/>
-  </p:clrMapOvr>
-  <mc:AlternateContent xmlns:mc="http://schemas.openxmlformats.org/markup-compatibility/2006">
-    <mc:Choice xmlns:p159="http://schemas.microsoft.com/office/powerpoint/2015/09/main" Requires="p159">
-      <p:transition xmlns:p14="http://schemas.microsoft.com/office/powerpoint/2010/main" spd="slow" p14:dur="2000">
-        <p159:morph option="byObject"/>
-      </p:transition>
-    </mc:Choice>
-    <mc:Fallback>
-      <p:transition spd="slow">
-        <p:fade/>
-      </p:transition>
-    </mc:Fallback>
-  </mc:AlternateContent>
-</p:sld>
-</file>
-
-<file path=ppt/slides/slide20.xml><?xml version="1.0" encoding="utf-8"?>
+<file path=ppt/slides/slide21.xml><?xml version="1.0" encoding="utf-8"?>
 <p:sld xmlns:a="http://schemas.openxmlformats.org/drawingml/2006/main" xmlns:r="http://schemas.openxmlformats.org/officeDocument/2006/relationships" xmlns:p="http://schemas.openxmlformats.org/presentationml/2006/main" show="0">
   <p:cSld>
     <p:spTree>
@@ -21273,7 +21955,7 @@
 </p:sld>
 </file>
 
-<file path=ppt/slides/slide21.xml><?xml version="1.0" encoding="utf-8"?>
+<file path=ppt/slides/slide22.xml><?xml version="1.0" encoding="utf-8"?>
 <p:sld xmlns:a="http://schemas.openxmlformats.org/drawingml/2006/main" xmlns:r="http://schemas.openxmlformats.org/officeDocument/2006/relationships" xmlns:p="http://schemas.openxmlformats.org/presentationml/2006/main" show="0">
   <p:cSld>
     <p:spTree>
@@ -21407,7 +22089,7 @@
 </p:sld>
 </file>
 
-<file path=ppt/slides/slide22.xml><?xml version="1.0" encoding="utf-8"?>
+<file path=ppt/slides/slide23.xml><?xml version="1.0" encoding="utf-8"?>
 <p:sld xmlns:a="http://schemas.openxmlformats.org/drawingml/2006/main" xmlns:r="http://schemas.openxmlformats.org/officeDocument/2006/relationships" xmlns:p="http://schemas.openxmlformats.org/presentationml/2006/main" show="0">
   <p:cSld>
     <p:spTree>
@@ -21541,7 +22223,7 @@
 </p:sld>
 </file>
 
-<file path=ppt/slides/slide23.xml><?xml version="1.0" encoding="utf-8"?>
+<file path=ppt/slides/slide24.xml><?xml version="1.0" encoding="utf-8"?>
 <p:sld xmlns:a="http://schemas.openxmlformats.org/drawingml/2006/main" xmlns:r="http://schemas.openxmlformats.org/officeDocument/2006/relationships" xmlns:p="http://schemas.openxmlformats.org/presentationml/2006/main" show="0">
   <p:cSld>
     <p:spTree>
@@ -21676,6 +22358,148 @@
 </file>
 
 <file path=ppt/slides/slide3.xml><?xml version="1.0" encoding="utf-8"?>
+<p:sld xmlns:a="http://schemas.openxmlformats.org/drawingml/2006/main" xmlns:r="http://schemas.openxmlformats.org/officeDocument/2006/relationships" xmlns:p="http://schemas.openxmlformats.org/presentationml/2006/main">
+  <p:cSld>
+    <p:spTree>
+      <p:nvGrpSpPr>
+        <p:cNvPr id="1" name=""/>
+        <p:cNvGrpSpPr/>
+        <p:nvPr/>
+      </p:nvGrpSpPr>
+      <p:grpSpPr>
+        <a:xfrm>
+          <a:off x="0" y="0"/>
+          <a:ext cx="0" cy="0"/>
+          <a:chOff x="0" y="0"/>
+          <a:chExt cx="0" cy="0"/>
+        </a:xfrm>
+      </p:grpSpPr>
+      <p:sp>
+        <p:nvSpPr>
+          <p:cNvPr id="2" name="Title 1">
+            <a:extLst>
+              <a:ext uri="{FF2B5EF4-FFF2-40B4-BE49-F238E27FC236}">
+                <a16:creationId xmlns:a16="http://schemas.microsoft.com/office/drawing/2014/main" id="{AB647BBE-BD36-43B1-81DB-29235E8F0BBC}"/>
+              </a:ext>
+            </a:extLst>
+          </p:cNvPr>
+          <p:cNvSpPr>
+            <a:spLocks noGrp="1"/>
+          </p:cNvSpPr>
+          <p:nvPr>
+            <p:ph type="title"/>
+          </p:nvPr>
+        </p:nvSpPr>
+        <p:spPr>
+          <a:xfrm>
+            <a:off x="838200" y="1085611"/>
+            <a:ext cx="10515600" cy="1325563"/>
+          </a:xfrm>
+        </p:spPr>
+        <p:txBody>
+          <a:bodyPr>
+            <a:normAutofit/>
+          </a:bodyPr>
+          <a:lstStyle/>
+          <a:p>
+            <a:r>
+              <a:rPr lang="en-US" sz="6000" b="1" u="sng" dirty="0"/>
+              <a:t>Contents</a:t>
+            </a:r>
+          </a:p>
+        </p:txBody>
+      </p:sp>
+      <p:sp>
+        <p:nvSpPr>
+          <p:cNvPr id="3" name="Content Placeholder 2">
+            <a:extLst>
+              <a:ext uri="{FF2B5EF4-FFF2-40B4-BE49-F238E27FC236}">
+                <a16:creationId xmlns:a16="http://schemas.microsoft.com/office/drawing/2014/main" id="{3C0C28D4-A766-466C-884F-22D3C4A82CB8}"/>
+              </a:ext>
+            </a:extLst>
+          </p:cNvPr>
+          <p:cNvSpPr>
+            <a:spLocks noGrp="1"/>
+          </p:cNvSpPr>
+          <p:nvPr>
+            <p:ph idx="1"/>
+          </p:nvPr>
+        </p:nvSpPr>
+        <p:spPr>
+          <a:xfrm>
+            <a:off x="838200" y="2506662"/>
+            <a:ext cx="10515600" cy="3748364"/>
+          </a:xfrm>
+        </p:spPr>
+        <p:txBody>
+          <a:bodyPr>
+            <a:normAutofit/>
+          </a:bodyPr>
+          <a:lstStyle/>
+          <a:p>
+            <a:pPr marL="514350" indent="-514350" algn="ctr">
+              <a:buAutoNum type="arabicPeriod"/>
+            </a:pPr>
+            <a:r>
+              <a:rPr lang="en-US" sz="4000" dirty="0"/>
+              <a:t>Algorithm</a:t>
+            </a:r>
+          </a:p>
+          <a:p>
+            <a:pPr marL="514350" indent="-514350" algn="ctr">
+              <a:buAutoNum type="arabicPeriod"/>
+            </a:pPr>
+            <a:r>
+              <a:rPr lang="en-US" sz="4000" dirty="0"/>
+              <a:t>Datapath</a:t>
+            </a:r>
+          </a:p>
+          <a:p>
+            <a:pPr marL="514350" indent="-514350" algn="ctr">
+              <a:buAutoNum type="arabicPeriod"/>
+            </a:pPr>
+            <a:r>
+              <a:rPr lang="en-US" sz="4000" dirty="0"/>
+              <a:t>Controller (FSM)</a:t>
+            </a:r>
+          </a:p>
+          <a:p>
+            <a:pPr marL="514350" indent="-514350" algn="ctr">
+              <a:buAutoNum type="arabicPeriod"/>
+            </a:pPr>
+            <a:r>
+              <a:rPr lang="en-US" sz="4000" dirty="0"/>
+              <a:t>Simulation result</a:t>
+            </a:r>
+          </a:p>
+        </p:txBody>
+      </p:sp>
+    </p:spTree>
+    <p:extLst>
+      <p:ext uri="{BB962C8B-B14F-4D97-AF65-F5344CB8AC3E}">
+        <p14:creationId xmlns:p14="http://schemas.microsoft.com/office/powerpoint/2010/main" val="1174850043"/>
+      </p:ext>
+    </p:extLst>
+  </p:cSld>
+  <p:clrMapOvr>
+    <a:masterClrMapping/>
+  </p:clrMapOvr>
+  <mc:AlternateContent xmlns:mc="http://schemas.openxmlformats.org/markup-compatibility/2006">
+    <mc:Choice xmlns:p159="http://schemas.microsoft.com/office/powerpoint/2015/09/main" Requires="p159">
+      <p:transition xmlns:p14="http://schemas.microsoft.com/office/powerpoint/2010/main" spd="slow" p14:dur="2000">
+        <p159:morph option="byObject"/>
+      </p:transition>
+    </mc:Choice>
+    <mc:Fallback>
+      <p:transition spd="slow">
+        <p:fade/>
+      </p:transition>
+    </mc:Fallback>
+  </mc:AlternateContent>
+</p:sld>
+</file>
+
+<file path=ppt/slides/slide4.xml><?xml version="1.0" encoding="utf-8"?>
 <p:sld xmlns:a="http://schemas.openxmlformats.org/drawingml/2006/main" xmlns:r="http://schemas.openxmlformats.org/officeDocument/2006/relationships" xmlns:p="http://schemas.openxmlformats.org/presentationml/2006/main">
   <p:cSld>
     <p:spTree>
@@ -22439,7 +23263,7 @@
 </p:sld>
 </file>
 
-<file path=ppt/slides/slide4.xml><?xml version="1.0" encoding="utf-8"?>
+<file path=ppt/slides/slide5.xml><?xml version="1.0" encoding="utf-8"?>
 <p:sld xmlns:a="http://schemas.openxmlformats.org/drawingml/2006/main" xmlns:r="http://schemas.openxmlformats.org/officeDocument/2006/relationships" xmlns:p="http://schemas.openxmlformats.org/presentationml/2006/main">
   <p:cSld>
     <p:spTree>
@@ -22622,7 +23446,7 @@
 </p:sld>
 </file>
 
-<file path=ppt/slides/slide5.xml><?xml version="1.0" encoding="utf-8"?>
+<file path=ppt/slides/slide6.xml><?xml version="1.0" encoding="utf-8"?>
 <p:sld xmlns:a="http://schemas.openxmlformats.org/drawingml/2006/main" xmlns:r="http://schemas.openxmlformats.org/officeDocument/2006/relationships" xmlns:p="http://schemas.openxmlformats.org/presentationml/2006/main">
   <p:cSld>
     <p:spTree>
@@ -23028,7 +23852,7 @@
 </p:sld>
 </file>
 
-<file path=ppt/slides/slide6.xml><?xml version="1.0" encoding="utf-8"?>
+<file path=ppt/slides/slide7.xml><?xml version="1.0" encoding="utf-8"?>
 <p:sld xmlns:a="http://schemas.openxmlformats.org/drawingml/2006/main" xmlns:r="http://schemas.openxmlformats.org/officeDocument/2006/relationships" xmlns:p="http://schemas.openxmlformats.org/presentationml/2006/main">
   <p:cSld>
     <p:spTree>
@@ -23128,7 +23952,7 @@
 </p:sld>
 </file>
 
-<file path=ppt/slides/slide7.xml><?xml version="1.0" encoding="utf-8"?>
+<file path=ppt/slides/slide8.xml><?xml version="1.0" encoding="utf-8"?>
 <p:sld xmlns:a="http://schemas.openxmlformats.org/drawingml/2006/main" xmlns:r="http://schemas.openxmlformats.org/officeDocument/2006/relationships" xmlns:p="http://schemas.openxmlformats.org/presentationml/2006/main">
   <p:cSld>
     <p:spTree>
@@ -23431,7 +24255,7 @@
 </p:sld>
 </file>
 
-<file path=ppt/slides/slide8.xml><?xml version="1.0" encoding="utf-8"?>
+<file path=ppt/slides/slide9.xml><?xml version="1.0" encoding="utf-8"?>
 <p:sld xmlns:a="http://schemas.openxmlformats.org/drawingml/2006/main" xmlns:r="http://schemas.openxmlformats.org/officeDocument/2006/relationships" xmlns:p="http://schemas.openxmlformats.org/presentationml/2006/main">
   <p:cSld>
     <p:spTree>
@@ -23645,240 +24469,6 @@
     <p:extLst>
       <p:ext uri="{BB962C8B-B14F-4D97-AF65-F5344CB8AC3E}">
         <p14:creationId xmlns:p14="http://schemas.microsoft.com/office/powerpoint/2010/main" val="641534785"/>
-      </p:ext>
-    </p:extLst>
-  </p:cSld>
-  <p:clrMapOvr>
-    <a:masterClrMapping/>
-  </p:clrMapOvr>
-  <mc:AlternateContent xmlns:mc="http://schemas.openxmlformats.org/markup-compatibility/2006">
-    <mc:Choice xmlns:p159="http://schemas.microsoft.com/office/powerpoint/2015/09/main" Requires="p159">
-      <p:transition xmlns:p14="http://schemas.microsoft.com/office/powerpoint/2010/main" spd="slow" p14:dur="2000">
-        <p159:morph option="byObject"/>
-      </p:transition>
-    </mc:Choice>
-    <mc:Fallback>
-      <p:transition spd="slow">
-        <p:fade/>
-      </p:transition>
-    </mc:Fallback>
-  </mc:AlternateContent>
-</p:sld>
-</file>
-
-<file path=ppt/slides/slide9.xml><?xml version="1.0" encoding="utf-8"?>
-<p:sld xmlns:a="http://schemas.openxmlformats.org/drawingml/2006/main" xmlns:r="http://schemas.openxmlformats.org/officeDocument/2006/relationships" xmlns:p="http://schemas.openxmlformats.org/presentationml/2006/main">
-  <p:cSld>
-    <p:spTree>
-      <p:nvGrpSpPr>
-        <p:cNvPr id="1" name=""/>
-        <p:cNvGrpSpPr/>
-        <p:nvPr/>
-      </p:nvGrpSpPr>
-      <p:grpSpPr>
-        <a:xfrm>
-          <a:off x="0" y="0"/>
-          <a:ext cx="0" cy="0"/>
-          <a:chOff x="0" y="0"/>
-          <a:chExt cx="0" cy="0"/>
-        </a:xfrm>
-      </p:grpSpPr>
-      <p:sp>
-        <p:nvSpPr>
-          <p:cNvPr id="2" name="Title 1">
-            <a:extLst>
-              <a:ext uri="{FF2B5EF4-FFF2-40B4-BE49-F238E27FC236}">
-                <a16:creationId xmlns:a16="http://schemas.microsoft.com/office/drawing/2014/main" id="{FB5AFFC8-F0A6-4334-81E0-BFA0B3F0C3E5}"/>
-              </a:ext>
-            </a:extLst>
-          </p:cNvPr>
-          <p:cNvSpPr>
-            <a:spLocks noGrp="1"/>
-          </p:cNvSpPr>
-          <p:nvPr>
-            <p:ph type="title"/>
-          </p:nvPr>
-        </p:nvSpPr>
-        <p:spPr>
-          <a:xfrm>
-            <a:off x="913795" y="609600"/>
-            <a:ext cx="7247633" cy="1326321"/>
-          </a:xfrm>
-        </p:spPr>
-        <p:txBody>
-          <a:bodyPr/>
-          <a:lstStyle/>
-          <a:p>
-            <a:r>
-              <a:rPr lang="en-US" b="1" dirty="0"/>
-              <a:t>3. Controller (FSM)</a:t>
-            </a:r>
-          </a:p>
-        </p:txBody>
-      </p:sp>
-      <p:sp>
-        <p:nvSpPr>
-          <p:cNvPr id="8" name="TextBox 7">
-            <a:extLst>
-              <a:ext uri="{FF2B5EF4-FFF2-40B4-BE49-F238E27FC236}">
-                <a16:creationId xmlns:a16="http://schemas.microsoft.com/office/drawing/2014/main" id="{81046DE5-B7A7-479C-828E-A25D4455D549}"/>
-              </a:ext>
-            </a:extLst>
-          </p:cNvPr>
-          <p:cNvSpPr txBox="1"/>
-          <p:nvPr/>
-        </p:nvSpPr>
-        <p:spPr>
-          <a:xfrm>
-            <a:off x="838201" y="2126294"/>
-            <a:ext cx="7323228" cy="2677656"/>
-          </a:xfrm>
-          <a:prstGeom prst="rect">
-            <a:avLst/>
-          </a:prstGeom>
-          <a:noFill/>
-        </p:spPr>
-        <p:txBody>
-          <a:bodyPr wrap="square">
-            <a:spAutoFit/>
-          </a:bodyPr>
-          <a:lstStyle/>
-          <a:p>
-            <a:pPr algn="l"/>
-            <a:r>
-              <a:rPr lang="en-US" sz="2400" b="0" i="0" dirty="0">
-                <a:effectLst/>
-                <a:latin typeface="-apple-system"/>
-              </a:rPr>
-              <a:t>We need 8 register files:</a:t>
-            </a:r>
-          </a:p>
-          <a:p>
-            <a:pPr marL="342900" indent="-342900" algn="l">
-              <a:buFont typeface="Arial" panose="020B0604020202020204" pitchFamily="34" charset="0"/>
-              <a:buChar char="•"/>
-            </a:pPr>
-            <a:r>
-              <a:rPr lang="en-US" sz="2400" dirty="0">
-                <a:latin typeface="-apple-system"/>
-              </a:rPr>
-              <a:t>RF[0] = 0</a:t>
-            </a:r>
-          </a:p>
-          <a:p>
-            <a:pPr marL="342900" indent="-342900" algn="l">
-              <a:buFont typeface="Arial" panose="020B0604020202020204" pitchFamily="34" charset="0"/>
-              <a:buChar char="•"/>
-            </a:pPr>
-            <a:r>
-              <a:rPr lang="en-US" sz="2400" b="0" i="0" dirty="0">
-                <a:effectLst/>
-                <a:latin typeface="-apple-system"/>
-              </a:rPr>
-              <a:t>RF[1] = </a:t>
-            </a:r>
-            <a:r>
-              <a:rPr lang="en-US" sz="2400" dirty="0">
-                <a:latin typeface="-apple-system"/>
-              </a:rPr>
-              <a:t>n</a:t>
-            </a:r>
-          </a:p>
-          <a:p>
-            <a:pPr marL="342900" indent="-342900" algn="l">
-              <a:buFont typeface="Arial" panose="020B0604020202020204" pitchFamily="34" charset="0"/>
-              <a:buChar char="•"/>
-            </a:pPr>
-            <a:r>
-              <a:rPr lang="en-US" sz="2400" b="0" i="0" dirty="0">
-                <a:effectLst/>
-                <a:latin typeface="-apple-system"/>
-              </a:rPr>
-              <a:t>RF[2] = x</a:t>
-            </a:r>
-          </a:p>
-          <a:p>
-            <a:pPr marL="342900" indent="-342900" algn="l">
-              <a:buFont typeface="Arial" panose="020B0604020202020204" pitchFamily="34" charset="0"/>
-              <a:buChar char="•"/>
-            </a:pPr>
-            <a:r>
-              <a:rPr lang="en-US" sz="2400" dirty="0">
-                <a:latin typeface="-apple-system"/>
-              </a:rPr>
-              <a:t>RF[3] = root</a:t>
-            </a:r>
-          </a:p>
-          <a:p>
-            <a:pPr marL="342900" indent="-342900" algn="l">
-              <a:buFont typeface="Arial" panose="020B0604020202020204" pitchFamily="34" charset="0"/>
-              <a:buChar char="•"/>
-            </a:pPr>
-            <a:r>
-              <a:rPr lang="en-US" sz="2400" dirty="0">
-                <a:latin typeface="-apple-system"/>
-              </a:rPr>
-              <a:t>RF[4] = 2</a:t>
-            </a:r>
-          </a:p>
-          <a:p>
-            <a:pPr marL="342900" indent="-342900" algn="l">
-              <a:buFont typeface="Arial" panose="020B0604020202020204" pitchFamily="34" charset="0"/>
-              <a:buChar char="•"/>
-            </a:pPr>
-            <a:r>
-              <a:rPr lang="en-US" sz="2400" dirty="0">
-                <a:latin typeface="-apple-system"/>
-              </a:rPr>
-              <a:t>RF[5] = result</a:t>
-            </a:r>
-            <a:endParaRPr lang="en-US" sz="2400" b="0" i="0" dirty="0">
-              <a:effectLst/>
-              <a:latin typeface="-apple-system"/>
-            </a:endParaRPr>
-          </a:p>
-        </p:txBody>
-      </p:sp>
-      <p:pic>
-        <p:nvPicPr>
-          <p:cNvPr id="6" name="Picture 5">
-            <a:extLst>
-              <a:ext uri="{FF2B5EF4-FFF2-40B4-BE49-F238E27FC236}">
-                <a16:creationId xmlns:a16="http://schemas.microsoft.com/office/drawing/2014/main" id="{EB63FA8E-C4C7-4559-8801-23E03AFBDC41}"/>
-              </a:ext>
-            </a:extLst>
-          </p:cNvPr>
-          <p:cNvPicPr>
-            <a:picLocks noChangeAspect="1"/>
-          </p:cNvPicPr>
-          <p:nvPr/>
-        </p:nvPicPr>
-        <p:blipFill>
-          <a:blip r:embed="rId2">
-            <a:extLst>
-              <a:ext uri="{28A0092B-C50C-407E-A947-70E740481C1C}">
-                <a14:useLocalDpi xmlns:a14="http://schemas.microsoft.com/office/drawing/2010/main" val="0"/>
-              </a:ext>
-            </a:extLst>
-          </a:blip>
-          <a:stretch>
-            <a:fillRect/>
-          </a:stretch>
-        </p:blipFill>
-        <p:spPr>
-          <a:xfrm>
-            <a:off x="8786013" y="0"/>
-            <a:ext cx="3405987" cy="6858000"/>
-          </a:xfrm>
-          <a:prstGeom prst="rect">
-            <a:avLst/>
-          </a:prstGeom>
-        </p:spPr>
-      </p:pic>
-    </p:spTree>
-    <p:extLst>
-      <p:ext uri="{BB962C8B-B14F-4D97-AF65-F5344CB8AC3E}">
-        <p14:creationId xmlns:p14="http://schemas.microsoft.com/office/powerpoint/2010/main" val="3930613559"/>
       </p:ext>
     </p:extLst>
   </p:cSld>

</xml_diff>